<commit_message>
Updated RGB and edited in figures ppt file
</commit_message>
<xml_diff>
--- a/Figures/ECOTOX_FIGURES.pptx
+++ b/Figures/ECOTOX_FIGURES.pptx
@@ -5,14 +5,18 @@
     <p:sldMasterId id="2147483672" r:id="rId1"/>
   </p:sldMasterIdLst>
   <p:notesMasterIdLst>
-    <p:notesMasterId r:id="rId7"/>
+    <p:notesMasterId r:id="rId11"/>
   </p:notesMasterIdLst>
   <p:sldIdLst>
-    <p:sldId id="260" r:id="rId2"/>
-    <p:sldId id="262" r:id="rId3"/>
-    <p:sldId id="261" r:id="rId4"/>
-    <p:sldId id="263" r:id="rId5"/>
-    <p:sldId id="258" r:id="rId6"/>
+    <p:sldId id="262" r:id="rId2"/>
+    <p:sldId id="260" r:id="rId3"/>
+    <p:sldId id="267" r:id="rId4"/>
+    <p:sldId id="261" r:id="rId5"/>
+    <p:sldId id="263" r:id="rId6"/>
+    <p:sldId id="258" r:id="rId7"/>
+    <p:sldId id="265" r:id="rId8"/>
+    <p:sldId id="266" r:id="rId9"/>
+    <p:sldId id="264" r:id="rId10"/>
   </p:sldIdLst>
   <p:sldSz cx="18288000" cy="18288000"/>
   <p:notesSz cx="6858000" cy="9144000"/>
@@ -201,7 +205,7 @@
           <a:p>
             <a:fld id="{71CB9E61-D85B-844A-8EF6-9D3458A43980}" type="datetimeFigureOut">
               <a:rPr lang="en-US" smtClean="0"/>
-              <a:t>9/19/24</a:t>
+              <a:t>9/24/24</a:t>
             </a:fld>
             <a:endParaRPr lang="en-US"/>
           </a:p>
@@ -473,7 +477,13 @@
   <p:cSld>
     <p:spTree>
       <p:nvGrpSpPr>
-        <p:cNvPr id="1" name=""/>
+        <p:cNvPr id="1" name="">
+          <a:extLst>
+            <a:ext uri="{FF2B5EF4-FFF2-40B4-BE49-F238E27FC236}">
+              <a16:creationId xmlns:a16="http://schemas.microsoft.com/office/drawing/2014/main" id="{49192197-7ED8-51AA-EADB-376EC84949F9}"/>
+            </a:ext>
+          </a:extLst>
+        </p:cNvPr>
         <p:cNvGrpSpPr/>
         <p:nvPr/>
       </p:nvGrpSpPr>
@@ -487,7 +497,13 @@
       </p:grpSpPr>
       <p:sp>
         <p:nvSpPr>
-          <p:cNvPr id="2" name="Slide Image Placeholder 1"/>
+          <p:cNvPr id="2" name="Slide Image Placeholder 1">
+            <a:extLst>
+              <a:ext uri="{FF2B5EF4-FFF2-40B4-BE49-F238E27FC236}">
+                <a16:creationId xmlns:a16="http://schemas.microsoft.com/office/drawing/2014/main" id="{52371E88-4CE6-7713-6D43-3DF9E7C375FA}"/>
+              </a:ext>
+            </a:extLst>
+          </p:cNvPr>
           <p:cNvSpPr>
             <a:spLocks noGrp="1" noRot="1" noChangeAspect="1"/>
           </p:cNvSpPr>
@@ -499,7 +515,13 @@
       </p:sp>
       <p:sp>
         <p:nvSpPr>
-          <p:cNvPr id="3" name="Notes Placeholder 2"/>
+          <p:cNvPr id="3" name="Notes Placeholder 2">
+            <a:extLst>
+              <a:ext uri="{FF2B5EF4-FFF2-40B4-BE49-F238E27FC236}">
+                <a16:creationId xmlns:a16="http://schemas.microsoft.com/office/drawing/2014/main" id="{51296FE6-E213-6C1A-5FDC-3599B3E7829F}"/>
+              </a:ext>
+            </a:extLst>
+          </p:cNvPr>
           <p:cNvSpPr>
             <a:spLocks noGrp="1"/>
           </p:cNvSpPr>
@@ -521,7 +543,13 @@
       </p:sp>
       <p:sp>
         <p:nvSpPr>
-          <p:cNvPr id="4" name="Slide Number Placeholder 3"/>
+          <p:cNvPr id="4" name="Slide Number Placeholder 3">
+            <a:extLst>
+              <a:ext uri="{FF2B5EF4-FFF2-40B4-BE49-F238E27FC236}">
+                <a16:creationId xmlns:a16="http://schemas.microsoft.com/office/drawing/2014/main" id="{1A685152-C833-3061-A60F-C8441FF89091}"/>
+              </a:ext>
+            </a:extLst>
+          </p:cNvPr>
           <p:cNvSpPr>
             <a:spLocks noGrp="1"/>
           </p:cNvSpPr>
@@ -545,7 +573,7 @@
     </p:spTree>
     <p:extLst>
       <p:ext uri="{BB962C8B-B14F-4D97-AF65-F5344CB8AC3E}">
-        <p14:creationId xmlns:p14="http://schemas.microsoft.com/office/powerpoint/2010/main" val="3785241545"/>
+        <p14:creationId xmlns:p14="http://schemas.microsoft.com/office/powerpoint/2010/main" val="2360450778"/>
       </p:ext>
     </p:extLst>
   </p:cSld>
@@ -624,6 +652,93 @@
             <a:fld id="{5DD5A255-A2B7-9747-A15F-4ECF908BA4E6}" type="slidenum">
               <a:rPr lang="en-US" smtClean="0"/>
               <a:t>4</a:t>
+            </a:fld>
+            <a:endParaRPr lang="en-US"/>
+          </a:p>
+        </p:txBody>
+      </p:sp>
+    </p:spTree>
+    <p:extLst>
+      <p:ext uri="{BB962C8B-B14F-4D97-AF65-F5344CB8AC3E}">
+        <p14:creationId xmlns:p14="http://schemas.microsoft.com/office/powerpoint/2010/main" val="3785241545"/>
+      </p:ext>
+    </p:extLst>
+  </p:cSld>
+  <p:clrMapOvr>
+    <a:masterClrMapping/>
+  </p:clrMapOvr>
+</p:notes>
+</file>
+
+<file path=ppt/notesSlides/notesSlide3.xml><?xml version="1.0" encoding="utf-8"?>
+<p:notes xmlns:a="http://schemas.openxmlformats.org/drawingml/2006/main" xmlns:r="http://schemas.openxmlformats.org/officeDocument/2006/relationships" xmlns:p="http://schemas.openxmlformats.org/presentationml/2006/main">
+  <p:cSld>
+    <p:spTree>
+      <p:nvGrpSpPr>
+        <p:cNvPr id="1" name=""/>
+        <p:cNvGrpSpPr/>
+        <p:nvPr/>
+      </p:nvGrpSpPr>
+      <p:grpSpPr>
+        <a:xfrm>
+          <a:off x="0" y="0"/>
+          <a:ext cx="0" cy="0"/>
+          <a:chOff x="0" y="0"/>
+          <a:chExt cx="0" cy="0"/>
+        </a:xfrm>
+      </p:grpSpPr>
+      <p:sp>
+        <p:nvSpPr>
+          <p:cNvPr id="2" name="Slide Image Placeholder 1"/>
+          <p:cNvSpPr>
+            <a:spLocks noGrp="1" noRot="1" noChangeAspect="1"/>
+          </p:cNvSpPr>
+          <p:nvPr>
+            <p:ph type="sldImg"/>
+          </p:nvPr>
+        </p:nvSpPr>
+        <p:spPr/>
+      </p:sp>
+      <p:sp>
+        <p:nvSpPr>
+          <p:cNvPr id="3" name="Notes Placeholder 2"/>
+          <p:cNvSpPr>
+            <a:spLocks noGrp="1"/>
+          </p:cNvSpPr>
+          <p:nvPr>
+            <p:ph type="body" idx="1"/>
+          </p:nvPr>
+        </p:nvSpPr>
+        <p:spPr/>
+        <p:txBody>
+          <a:bodyPr/>
+          <a:lstStyle/>
+          <a:p>
+            <a:r>
+              <a:rPr lang="en-US" dirty="0"/>
+              <a:t>25</a:t>
+            </a:r>
+          </a:p>
+        </p:txBody>
+      </p:sp>
+      <p:sp>
+        <p:nvSpPr>
+          <p:cNvPr id="4" name="Slide Number Placeholder 3"/>
+          <p:cNvSpPr>
+            <a:spLocks noGrp="1"/>
+          </p:cNvSpPr>
+          <p:nvPr>
+            <p:ph type="sldNum" sz="quarter" idx="5"/>
+          </p:nvPr>
+        </p:nvSpPr>
+        <p:spPr/>
+        <p:txBody>
+          <a:bodyPr/>
+          <a:lstStyle/>
+          <a:p>
+            <a:fld id="{5DD5A255-A2B7-9747-A15F-4ECF908BA4E6}" type="slidenum">
+              <a:rPr lang="en-US" smtClean="0"/>
+              <a:t>5</a:t>
             </a:fld>
             <a:endParaRPr lang="en-US"/>
           </a:p>
@@ -773,7 +888,7 @@
           <a:p>
             <a:fld id="{FB176627-9E05-F64F-A978-692237CD2630}" type="datetimeFigureOut">
               <a:rPr lang="en-US" smtClean="0"/>
-              <a:t>9/19/24</a:t>
+              <a:t>9/24/24</a:t>
             </a:fld>
             <a:endParaRPr lang="en-US"/>
           </a:p>
@@ -943,7 +1058,7 @@
           <a:p>
             <a:fld id="{FB176627-9E05-F64F-A978-692237CD2630}" type="datetimeFigureOut">
               <a:rPr lang="en-US" smtClean="0"/>
-              <a:t>9/19/24</a:t>
+              <a:t>9/24/24</a:t>
             </a:fld>
             <a:endParaRPr lang="en-US"/>
           </a:p>
@@ -1123,7 +1238,7 @@
           <a:p>
             <a:fld id="{FB176627-9E05-F64F-A978-692237CD2630}" type="datetimeFigureOut">
               <a:rPr lang="en-US" smtClean="0"/>
-              <a:t>9/19/24</a:t>
+              <a:t>9/24/24</a:t>
             </a:fld>
             <a:endParaRPr lang="en-US"/>
           </a:p>
@@ -1293,7 +1408,7 @@
           <a:p>
             <a:fld id="{FB176627-9E05-F64F-A978-692237CD2630}" type="datetimeFigureOut">
               <a:rPr lang="en-US" smtClean="0"/>
-              <a:t>9/19/24</a:t>
+              <a:t>9/24/24</a:t>
             </a:fld>
             <a:endParaRPr lang="en-US"/>
           </a:p>
@@ -1539,7 +1654,7 @@
           <a:p>
             <a:fld id="{FB176627-9E05-F64F-A978-692237CD2630}" type="datetimeFigureOut">
               <a:rPr lang="en-US" smtClean="0"/>
-              <a:t>9/19/24</a:t>
+              <a:t>9/24/24</a:t>
             </a:fld>
             <a:endParaRPr lang="en-US"/>
           </a:p>
@@ -1771,7 +1886,7 @@
           <a:p>
             <a:fld id="{FB176627-9E05-F64F-A978-692237CD2630}" type="datetimeFigureOut">
               <a:rPr lang="en-US" smtClean="0"/>
-              <a:t>9/19/24</a:t>
+              <a:t>9/24/24</a:t>
             </a:fld>
             <a:endParaRPr lang="en-US"/>
           </a:p>
@@ -2138,7 +2253,7 @@
           <a:p>
             <a:fld id="{FB176627-9E05-F64F-A978-692237CD2630}" type="datetimeFigureOut">
               <a:rPr lang="en-US" smtClean="0"/>
-              <a:t>9/19/24</a:t>
+              <a:t>9/24/24</a:t>
             </a:fld>
             <a:endParaRPr lang="en-US"/>
           </a:p>
@@ -2256,7 +2371,7 @@
           <a:p>
             <a:fld id="{FB176627-9E05-F64F-A978-692237CD2630}" type="datetimeFigureOut">
               <a:rPr lang="en-US" smtClean="0"/>
-              <a:t>9/19/24</a:t>
+              <a:t>9/24/24</a:t>
             </a:fld>
             <a:endParaRPr lang="en-US"/>
           </a:p>
@@ -2351,7 +2466,7 @@
           <a:p>
             <a:fld id="{FB176627-9E05-F64F-A978-692237CD2630}" type="datetimeFigureOut">
               <a:rPr lang="en-US" smtClean="0"/>
-              <a:t>9/19/24</a:t>
+              <a:t>9/24/24</a:t>
             </a:fld>
             <a:endParaRPr lang="en-US"/>
           </a:p>
@@ -2628,7 +2743,7 @@
           <a:p>
             <a:fld id="{FB176627-9E05-F64F-A978-692237CD2630}" type="datetimeFigureOut">
               <a:rPr lang="en-US" smtClean="0"/>
-              <a:t>9/19/24</a:t>
+              <a:t>9/24/24</a:t>
             </a:fld>
             <a:endParaRPr lang="en-US"/>
           </a:p>
@@ -2885,7 +3000,7 @@
           <a:p>
             <a:fld id="{FB176627-9E05-F64F-A978-692237CD2630}" type="datetimeFigureOut">
               <a:rPr lang="en-US" smtClean="0"/>
-              <a:t>9/19/24</a:t>
+              <a:t>9/24/24</a:t>
             </a:fld>
             <a:endParaRPr lang="en-US"/>
           </a:p>
@@ -3098,7 +3213,7 @@
           <a:p>
             <a:fld id="{FB176627-9E05-F64F-A978-692237CD2630}" type="datetimeFigureOut">
               <a:rPr lang="en-US" smtClean="0"/>
-              <a:t>9/19/24</a:t>
+              <a:t>9/24/24</a:t>
             </a:fld>
             <a:endParaRPr lang="en-US"/>
           </a:p>
@@ -3503,116 +3618,12 @@
           <a:chExt cx="0" cy="0"/>
         </a:xfrm>
       </p:grpSpPr>
-      <p:grpSp>
-        <p:nvGrpSpPr>
-          <p:cNvPr id="14" name="Group 13">
-            <a:extLst>
-              <a:ext uri="{FF2B5EF4-FFF2-40B4-BE49-F238E27FC236}">
-                <a16:creationId xmlns:a16="http://schemas.microsoft.com/office/drawing/2014/main" id="{E2E3B11A-DDDD-2073-75A9-09FCDF09E54E}"/>
-              </a:ext>
-            </a:extLst>
-          </p:cNvPr>
-          <p:cNvGrpSpPr/>
-          <p:nvPr/>
-        </p:nvGrpSpPr>
-        <p:grpSpPr>
-          <a:xfrm>
-            <a:off x="1078695" y="1432149"/>
-            <a:ext cx="10247934" cy="11055310"/>
-            <a:chOff x="1078695" y="1432149"/>
-            <a:chExt cx="10247934" cy="11055310"/>
-          </a:xfrm>
-        </p:grpSpPr>
-        <p:pic>
-          <p:nvPicPr>
-            <p:cNvPr id="11" name="Picture 10" descr="A graph of different types of temperature&#10;&#10;Description automatically generated with medium confidence">
-              <a:extLst>
-                <a:ext uri="{FF2B5EF4-FFF2-40B4-BE49-F238E27FC236}">
-                  <a16:creationId xmlns:a16="http://schemas.microsoft.com/office/drawing/2014/main" id="{EF119BB0-3E96-390A-67AE-3F80D05C63E2}"/>
-                </a:ext>
-              </a:extLst>
-            </p:cNvPr>
-            <p:cNvPicPr>
-              <a:picLocks noChangeAspect="1"/>
-            </p:cNvPicPr>
-            <p:nvPr/>
-          </p:nvPicPr>
-          <p:blipFill>
-            <a:blip r:embed="rId2"/>
-            <a:srcRect l="3920" r="20628" b="15464"/>
-            <a:stretch/>
-          </p:blipFill>
-          <p:spPr>
-            <a:xfrm>
-              <a:off x="1078695" y="1432149"/>
-              <a:ext cx="10247934" cy="10833415"/>
-            </a:xfrm>
-            <a:prstGeom prst="rect">
-              <a:avLst/>
-            </a:prstGeom>
-          </p:spPr>
-        </p:pic>
-        <p:sp>
-          <p:nvSpPr>
-            <p:cNvPr id="13" name="Rectangle 12">
-              <a:extLst>
-                <a:ext uri="{FF2B5EF4-FFF2-40B4-BE49-F238E27FC236}">
-                  <a16:creationId xmlns:a16="http://schemas.microsoft.com/office/drawing/2014/main" id="{725733A9-D831-3302-6867-F3075BA51DD9}"/>
-                </a:ext>
-              </a:extLst>
-            </p:cNvPr>
-            <p:cNvSpPr/>
-            <p:nvPr/>
-          </p:nvSpPr>
-          <p:spPr>
-            <a:xfrm>
-              <a:off x="2410265" y="11990154"/>
-              <a:ext cx="7748337" cy="497305"/>
-            </a:xfrm>
-            <a:prstGeom prst="rect">
-              <a:avLst/>
-            </a:prstGeom>
-            <a:solidFill>
-              <a:schemeClr val="bg1"/>
-            </a:solidFill>
-            <a:ln>
-              <a:solidFill>
-                <a:schemeClr val="bg1"/>
-              </a:solidFill>
-            </a:ln>
-          </p:spPr>
-          <p:style>
-            <a:lnRef idx="2">
-              <a:schemeClr val="accent1">
-                <a:shade val="15000"/>
-              </a:schemeClr>
-            </a:lnRef>
-            <a:fillRef idx="1">
-              <a:schemeClr val="accent1"/>
-            </a:fillRef>
-            <a:effectRef idx="0">
-              <a:schemeClr val="accent1"/>
-            </a:effectRef>
-            <a:fontRef idx="minor">
-              <a:schemeClr val="lt1"/>
-            </a:fontRef>
-          </p:style>
-          <p:txBody>
-            <a:bodyPr rtlCol="0" anchor="ctr"/>
-            <a:lstStyle/>
-            <a:p>
-              <a:pPr algn="ctr"/>
-              <a:endParaRPr lang="en-US"/>
-            </a:p>
-          </p:txBody>
-        </p:sp>
-      </p:grpSp>
       <p:pic>
         <p:nvPicPr>
-          <p:cNvPr id="278" name="Picture 277" descr="A graph of a number of different types of oxygen&#10;&#10;Description automatically generated with medium confidence">
-            <a:extLst>
-              <a:ext uri="{FF2B5EF4-FFF2-40B4-BE49-F238E27FC236}">
-                <a16:creationId xmlns:a16="http://schemas.microsoft.com/office/drawing/2014/main" id="{BF114E2A-AA17-8A9B-A248-5B9F876CD0E3}"/>
+          <p:cNvPr id="7" name="Picture 6" descr="A graph of a number of different levels of temperature&#10;&#10;Description automatically generated with medium confidence">
+            <a:extLst>
+              <a:ext uri="{FF2B5EF4-FFF2-40B4-BE49-F238E27FC236}">
+                <a16:creationId xmlns:a16="http://schemas.microsoft.com/office/drawing/2014/main" id="{06AD32C1-38C1-2C69-0469-204E6336BEA9}"/>
               </a:ext>
             </a:extLst>
           </p:cNvPr>
@@ -3622,13 +3633,199 @@
           <p:nvPr/>
         </p:nvPicPr>
         <p:blipFill>
-          <a:blip r:embed="rId3"/>
+          <a:blip r:embed="rId2"/>
+          <a:srcRect t="4631"/>
+          <a:stretch/>
+        </p:blipFill>
+        <p:spPr>
+          <a:xfrm>
+            <a:off x="2019299" y="3505200"/>
+            <a:ext cx="13468214" cy="8763000"/>
+          </a:xfrm>
+          <a:prstGeom prst="rect">
+            <a:avLst/>
+          </a:prstGeom>
+        </p:spPr>
+      </p:pic>
+      <p:sp>
+        <p:nvSpPr>
+          <p:cNvPr id="8" name="TextBox 7">
+            <a:extLst>
+              <a:ext uri="{FF2B5EF4-FFF2-40B4-BE49-F238E27FC236}">
+                <a16:creationId xmlns:a16="http://schemas.microsoft.com/office/drawing/2014/main" id="{4F23DD90-BA99-9852-E00E-F9D9577167F3}"/>
+              </a:ext>
+            </a:extLst>
+          </p:cNvPr>
+          <p:cNvSpPr txBox="1"/>
+          <p:nvPr/>
+        </p:nvSpPr>
+        <p:spPr>
+          <a:xfrm rot="16200000">
+            <a:off x="-2990875" y="7814280"/>
+            <a:ext cx="8904659" cy="584775"/>
+          </a:xfrm>
+          <a:prstGeom prst="rect">
+            <a:avLst/>
+          </a:prstGeom>
+          <a:solidFill>
+            <a:schemeClr val="bg1"/>
+          </a:solidFill>
+          <a:ln>
+            <a:solidFill>
+              <a:schemeClr val="bg1"/>
+            </a:solidFill>
+          </a:ln>
+        </p:spPr>
+        <p:txBody>
+          <a:bodyPr wrap="square" rtlCol="0">
+            <a:spAutoFit/>
+          </a:bodyPr>
+          <a:lstStyle/>
+          <a:p>
+            <a:pPr algn="ctr"/>
+            <a:r>
+              <a:rPr lang="en-US" sz="3200" dirty="0">
+                <a:solidFill>
+                  <a:srgbClr val="4D4D4D"/>
+                </a:solidFill>
+                <a:latin typeface="Times New Roman" panose="02020603050405020304" pitchFamily="18" charset="0"/>
+                <a:cs typeface="Times New Roman" panose="02020603050405020304" pitchFamily="18" charset="0"/>
+              </a:rPr>
+              <a:t>Average polyp extension score</a:t>
+            </a:r>
+          </a:p>
+        </p:txBody>
+      </p:sp>
+      <p:sp>
+        <p:nvSpPr>
+          <p:cNvPr id="9" name="TextBox 8">
+            <a:extLst>
+              <a:ext uri="{FF2B5EF4-FFF2-40B4-BE49-F238E27FC236}">
+                <a16:creationId xmlns:a16="http://schemas.microsoft.com/office/drawing/2014/main" id="{3D4800F3-93C2-14B5-BD42-8D8D72982070}"/>
+              </a:ext>
+            </a:extLst>
+          </p:cNvPr>
+          <p:cNvSpPr txBox="1"/>
+          <p:nvPr/>
+        </p:nvSpPr>
+        <p:spPr>
+          <a:xfrm>
+            <a:off x="2870520" y="12427032"/>
+            <a:ext cx="8904659" cy="584775"/>
+          </a:xfrm>
+          <a:prstGeom prst="rect">
+            <a:avLst/>
+          </a:prstGeom>
+          <a:solidFill>
+            <a:schemeClr val="bg1"/>
+          </a:solidFill>
+          <a:ln>
+            <a:solidFill>
+              <a:schemeClr val="bg1"/>
+            </a:solidFill>
+          </a:ln>
+        </p:spPr>
+        <p:txBody>
+          <a:bodyPr wrap="square" rtlCol="0">
+            <a:spAutoFit/>
+          </a:bodyPr>
+          <a:lstStyle/>
+          <a:p>
+            <a:pPr algn="ctr"/>
+            <a:r>
+              <a:rPr lang="en-US" sz="3200" dirty="0">
+                <a:solidFill>
+                  <a:srgbClr val="4D4D4D"/>
+                </a:solidFill>
+                <a:latin typeface="Times New Roman" panose="02020603050405020304" pitchFamily="18" charset="0"/>
+                <a:cs typeface="Times New Roman" panose="02020603050405020304" pitchFamily="18" charset="0"/>
+              </a:rPr>
+              <a:t>Day of experiment</a:t>
+            </a:r>
+          </a:p>
+        </p:txBody>
+      </p:sp>
+      <p:pic>
+        <p:nvPicPr>
+          <p:cNvPr id="10" name="Picture 9" descr="A graph of a number of different levels of temperature&#10;&#10;Description automatically generated with medium confidence">
+            <a:extLst>
+              <a:ext uri="{FF2B5EF4-FFF2-40B4-BE49-F238E27FC236}">
+                <a16:creationId xmlns:a16="http://schemas.microsoft.com/office/drawing/2014/main" id="{67A79C09-97FC-93F0-0A2B-6BF5F4505423}"/>
+              </a:ext>
+            </a:extLst>
+          </p:cNvPr>
+          <p:cNvPicPr>
+            <a:picLocks noChangeAspect="1"/>
+          </p:cNvPicPr>
+          <p:nvPr/>
+        </p:nvPicPr>
+        <p:blipFill>
+          <a:blip r:embed="rId2"/>
+          <a:srcRect l="77809" t="34108" b="33392"/>
+          <a:stretch/>
+        </p:blipFill>
+        <p:spPr>
+          <a:xfrm>
+            <a:off x="12640569" y="6191179"/>
+            <a:ext cx="3393898" cy="3391041"/>
+          </a:xfrm>
+          <a:prstGeom prst="rect">
+            <a:avLst/>
+          </a:prstGeom>
+        </p:spPr>
+      </p:pic>
+    </p:spTree>
+    <p:extLst>
+      <p:ext uri="{BB962C8B-B14F-4D97-AF65-F5344CB8AC3E}">
+        <p14:creationId xmlns:p14="http://schemas.microsoft.com/office/powerpoint/2010/main" val="3685343335"/>
+      </p:ext>
+    </p:extLst>
+  </p:cSld>
+  <p:clrMapOvr>
+    <a:masterClrMapping/>
+  </p:clrMapOvr>
+</p:sld>
+</file>
+
+<file path=ppt/slides/slide2.xml><?xml version="1.0" encoding="utf-8"?>
+<p:sld xmlns:a="http://schemas.openxmlformats.org/drawingml/2006/main" xmlns:r="http://schemas.openxmlformats.org/officeDocument/2006/relationships" xmlns:p="http://schemas.openxmlformats.org/presentationml/2006/main">
+  <p:cSld>
+    <p:spTree>
+      <p:nvGrpSpPr>
+        <p:cNvPr id="1" name=""/>
+        <p:cNvGrpSpPr/>
+        <p:nvPr/>
+      </p:nvGrpSpPr>
+      <p:grpSpPr>
+        <a:xfrm>
+          <a:off x="0" y="0"/>
+          <a:ext cx="0" cy="0"/>
+          <a:chOff x="0" y="0"/>
+          <a:chExt cx="0" cy="0"/>
+        </a:xfrm>
+      </p:grpSpPr>
+      <p:pic>
+        <p:nvPicPr>
+          <p:cNvPr id="278" name="Picture 277" descr="A graph of a number of different types of oxygen&#10;&#10;Description automatically generated with medium confidence">
+            <a:extLst>
+              <a:ext uri="{FF2B5EF4-FFF2-40B4-BE49-F238E27FC236}">
+                <a16:creationId xmlns:a16="http://schemas.microsoft.com/office/drawing/2014/main" id="{BF114E2A-AA17-8A9B-A248-5B9F876CD0E3}"/>
+              </a:ext>
+            </a:extLst>
+          </p:cNvPr>
+          <p:cNvPicPr>
+            <a:picLocks noChangeAspect="1"/>
+          </p:cNvPicPr>
+          <p:nvPr/>
+        </p:nvPicPr>
+        <p:blipFill>
+          <a:blip r:embed="rId2"/>
           <a:srcRect l="79007" t="38202" r="1545" b="53405"/>
           <a:stretch/>
         </p:blipFill>
         <p:spPr>
           <a:xfrm>
-            <a:off x="11353231" y="5051056"/>
+            <a:off x="15024637" y="4964730"/>
             <a:ext cx="2761487" cy="1292352"/>
           </a:xfrm>
           <a:prstGeom prst="rect">
@@ -3650,7 +3847,7 @@
         </p:nvSpPr>
         <p:spPr>
           <a:xfrm>
-            <a:off x="11517389" y="6474614"/>
+            <a:off x="15143030" y="6484331"/>
             <a:ext cx="3548032" cy="523220"/>
           </a:xfrm>
           <a:prstGeom prst="rect">
@@ -3711,7 +3908,7 @@
         </p:nvSpPr>
         <p:spPr>
           <a:xfrm>
-            <a:off x="11991181" y="6936279"/>
+            <a:off x="15616822" y="6945996"/>
             <a:ext cx="2123537" cy="400110"/>
           </a:xfrm>
           <a:prstGeom prst="rect">
@@ -3782,7 +3979,7 @@
         </p:nvSpPr>
         <p:spPr>
           <a:xfrm>
-            <a:off x="11619472" y="7451176"/>
+            <a:off x="15245113" y="7460893"/>
             <a:ext cx="351309" cy="295685"/>
           </a:xfrm>
           <a:custGeom>
@@ -3872,7 +4069,7 @@
         </p:nvSpPr>
         <p:spPr>
           <a:xfrm>
-            <a:off x="12039030" y="7397944"/>
+            <a:off x="15664671" y="7407661"/>
             <a:ext cx="1221937" cy="400110"/>
           </a:xfrm>
           <a:prstGeom prst="rect">
@@ -3920,7 +4117,7 @@
         </p:nvSpPr>
         <p:spPr>
           <a:xfrm>
-            <a:off x="11619473" y="6973759"/>
+            <a:off x="15245114" y="6983476"/>
             <a:ext cx="351309" cy="295685"/>
           </a:xfrm>
           <a:custGeom>
@@ -4015,7 +4212,7 @@
         </p:nvSpPr>
         <p:spPr>
           <a:xfrm rot="16200000">
-            <a:off x="-4296495" y="6294860"/>
+            <a:off x="-4265736" y="5964694"/>
             <a:ext cx="9784083" cy="584775"/>
           </a:xfrm>
           <a:prstGeom prst="rect">
@@ -4111,10 +4308,10 @@
       </p:sp>
       <p:pic>
         <p:nvPicPr>
-          <p:cNvPr id="276" name="Picture 275" descr="A graph of a number of different types of oxygen&#10;&#10;Description automatically generated with medium confidence">
-            <a:extLst>
-              <a:ext uri="{FF2B5EF4-FFF2-40B4-BE49-F238E27FC236}">
-                <a16:creationId xmlns:a16="http://schemas.microsoft.com/office/drawing/2014/main" id="{8EE88DEA-96A6-F1BF-7A7E-A99D9434029B}"/>
+          <p:cNvPr id="277" name="Picture 276" descr="A graph of a number of different types of oxygen&#10;&#10;Description automatically generated with medium confidence">
+            <a:extLst>
+              <a:ext uri="{FF2B5EF4-FFF2-40B4-BE49-F238E27FC236}">
+                <a16:creationId xmlns:a16="http://schemas.microsoft.com/office/drawing/2014/main" id="{6FF1D802-94C5-FE41-97A0-8034F52834F9}"/>
               </a:ext>
             </a:extLst>
           </p:cNvPr>
@@ -4124,42 +4321,13 @@
           <p:nvPr/>
         </p:nvPicPr>
         <p:blipFill>
-          <a:blip r:embed="rId3"/>
-          <a:srcRect l="77753" t="47585" b="42914"/>
-          <a:stretch/>
-        </p:blipFill>
-        <p:spPr>
-          <a:xfrm>
-            <a:off x="11246961" y="7915748"/>
-            <a:ext cx="3158922" cy="1463040"/>
-          </a:xfrm>
-          <a:prstGeom prst="rect">
-            <a:avLst/>
-          </a:prstGeom>
-        </p:spPr>
-      </p:pic>
-      <p:pic>
-        <p:nvPicPr>
-          <p:cNvPr id="277" name="Picture 276" descr="A graph of a number of different types of oxygen&#10;&#10;Description automatically generated with medium confidence">
-            <a:extLst>
-              <a:ext uri="{FF2B5EF4-FFF2-40B4-BE49-F238E27FC236}">
-                <a16:creationId xmlns:a16="http://schemas.microsoft.com/office/drawing/2014/main" id="{6FF1D802-94C5-FE41-97A0-8034F52834F9}"/>
-              </a:ext>
-            </a:extLst>
-          </p:cNvPr>
-          <p:cNvPicPr>
-            <a:picLocks noChangeAspect="1"/>
-          </p:cNvPicPr>
-          <p:nvPr/>
-        </p:nvPicPr>
-        <p:blipFill>
-          <a:blip r:embed="rId3"/>
+          <a:blip r:embed="rId2"/>
           <a:srcRect l="77753" t="29413" b="62194"/>
           <a:stretch/>
         </p:blipFill>
         <p:spPr>
           <a:xfrm>
-            <a:off x="11246961" y="3743413"/>
+            <a:off x="14825920" y="3614679"/>
             <a:ext cx="3158922" cy="1292352"/>
           </a:xfrm>
           <a:prstGeom prst="rect">
@@ -4181,7 +4349,7 @@
         </p:nvSpPr>
         <p:spPr>
           <a:xfrm>
-            <a:off x="1691516" y="908929"/>
+            <a:off x="1534226" y="1559876"/>
             <a:ext cx="7242150" cy="523220"/>
           </a:xfrm>
           <a:prstGeom prst="rect">
@@ -4265,142 +4433,114 @@
           </a:p>
         </p:txBody>
       </p:sp>
-      <p:sp>
-        <p:nvSpPr>
-          <p:cNvPr id="7" name="TextBox 6">
-            <a:extLst>
-              <a:ext uri="{FF2B5EF4-FFF2-40B4-BE49-F238E27FC236}">
-                <a16:creationId xmlns:a16="http://schemas.microsoft.com/office/drawing/2014/main" id="{18530DF5-B2B7-B562-ADAA-7A51A225E70B}"/>
-              </a:ext>
-            </a:extLst>
-          </p:cNvPr>
-          <p:cNvSpPr txBox="1"/>
+      <p:grpSp>
+        <p:nvGrpSpPr>
+          <p:cNvPr id="10" name="Group 9">
+            <a:extLst>
+              <a:ext uri="{FF2B5EF4-FFF2-40B4-BE49-F238E27FC236}">
+                <a16:creationId xmlns:a16="http://schemas.microsoft.com/office/drawing/2014/main" id="{26A51CAD-8800-E512-FA43-0B5BF2B4947C}"/>
+              </a:ext>
+            </a:extLst>
+          </p:cNvPr>
+          <p:cNvGrpSpPr/>
           <p:nvPr/>
-        </p:nvSpPr>
-        <p:spPr>
-          <a:xfrm>
-            <a:off x="2736812" y="12496396"/>
-            <a:ext cx="3963442" cy="584775"/>
-          </a:xfrm>
-          <a:prstGeom prst="rect">
-            <a:avLst/>
-          </a:prstGeom>
-          <a:solidFill>
-            <a:schemeClr val="bg1"/>
-          </a:solidFill>
-          <a:ln>
+        </p:nvGrpSpPr>
+        <p:grpSpPr>
+          <a:xfrm>
+            <a:off x="1045225" y="1986443"/>
+            <a:ext cx="14020196" cy="11902302"/>
+            <a:chOff x="1045225" y="1986443"/>
+            <a:chExt cx="14020196" cy="11902302"/>
+          </a:xfrm>
+        </p:grpSpPr>
+        <p:pic>
+          <p:nvPicPr>
+            <p:cNvPr id="2" name="Picture 1">
+              <a:extLst>
+                <a:ext uri="{FF2B5EF4-FFF2-40B4-BE49-F238E27FC236}">
+                  <a16:creationId xmlns:a16="http://schemas.microsoft.com/office/drawing/2014/main" id="{33163D4B-0869-3DC8-AB87-CCC58DAB4087}"/>
+                </a:ext>
+              </a:extLst>
+            </p:cNvPr>
+            <p:cNvPicPr>
+              <a:picLocks noChangeAspect="1"/>
+            </p:cNvPicPr>
+            <p:nvPr/>
+          </p:nvPicPr>
+          <p:blipFill>
+            <a:blip r:embed="rId3"/>
+            <a:srcRect l="3239" r="16219" b="4827"/>
+            <a:stretch/>
+          </p:blipFill>
+          <p:spPr>
+            <a:xfrm>
+              <a:off x="1045225" y="1986443"/>
+              <a:ext cx="14020196" cy="11094728"/>
+            </a:xfrm>
+            <a:prstGeom prst="rect">
+              <a:avLst/>
+            </a:prstGeom>
+          </p:spPr>
+        </p:pic>
+        <p:sp>
+          <p:nvSpPr>
+            <p:cNvPr id="6" name="Rectangle 5">
+              <a:extLst>
+                <a:ext uri="{FF2B5EF4-FFF2-40B4-BE49-F238E27FC236}">
+                  <a16:creationId xmlns:a16="http://schemas.microsoft.com/office/drawing/2014/main" id="{8AF3F8DE-30E2-C025-4421-E56A5EA0B66E}"/>
+                </a:ext>
+              </a:extLst>
+            </p:cNvPr>
+            <p:cNvSpPr/>
+            <p:nvPr/>
+          </p:nvSpPr>
+          <p:spPr>
+            <a:xfrm>
+              <a:off x="2090058" y="11569700"/>
+              <a:ext cx="11521440" cy="2319045"/>
+            </a:xfrm>
+            <a:prstGeom prst="rect">
+              <a:avLst/>
+            </a:prstGeom>
             <a:solidFill>
               <a:schemeClr val="bg1"/>
             </a:solidFill>
-          </a:ln>
-        </p:spPr>
-        <p:txBody>
-          <a:bodyPr wrap="square" rtlCol="0">
-            <a:spAutoFit/>
-          </a:bodyPr>
-          <a:lstStyle/>
-          <a:p>
-            <a:r>
-              <a:rPr lang="en-US" sz="3200" dirty="0">
-                <a:solidFill>
-                  <a:srgbClr val="4D4D4D"/>
-                </a:solidFill>
-                <a:latin typeface="Times New Roman" panose="02020603050405020304" pitchFamily="18" charset="0"/>
-                <a:cs typeface="Times New Roman" panose="02020603050405020304" pitchFamily="18" charset="0"/>
-              </a:rPr>
-              <a:t>Background NO</a:t>
-            </a:r>
-            <a:r>
-              <a:rPr lang="en-US" sz="3200" baseline="-25000" dirty="0">
-                <a:solidFill>
-                  <a:srgbClr val="4D4D4D"/>
-                </a:solidFill>
-                <a:latin typeface="Times New Roman" panose="02020603050405020304" pitchFamily="18" charset="0"/>
-                <a:cs typeface="Times New Roman" panose="02020603050405020304" pitchFamily="18" charset="0"/>
-              </a:rPr>
-              <a:t>3</a:t>
-            </a:r>
-            <a:endParaRPr lang="en-US" sz="3200" dirty="0">
-              <a:solidFill>
-                <a:srgbClr val="4D4D4D"/>
-              </a:solidFill>
-              <a:latin typeface="Times New Roman" panose="02020603050405020304" pitchFamily="18" charset="0"/>
-              <a:cs typeface="Times New Roman" panose="02020603050405020304" pitchFamily="18" charset="0"/>
-            </a:endParaRPr>
-          </a:p>
-        </p:txBody>
-      </p:sp>
-      <p:sp>
-        <p:nvSpPr>
-          <p:cNvPr id="9" name="TextBox 8">
-            <a:extLst>
-              <a:ext uri="{FF2B5EF4-FFF2-40B4-BE49-F238E27FC236}">
-                <a16:creationId xmlns:a16="http://schemas.microsoft.com/office/drawing/2014/main" id="{1F6A65C0-B033-182C-5422-2C2C3AF61F46}"/>
-              </a:ext>
-            </a:extLst>
-          </p:cNvPr>
-          <p:cNvSpPr txBox="1"/>
-          <p:nvPr/>
-        </p:nvSpPr>
-        <p:spPr>
-          <a:xfrm>
-            <a:off x="7563610" y="12540973"/>
-            <a:ext cx="2594992" cy="584775"/>
-          </a:xfrm>
-          <a:prstGeom prst="rect">
-            <a:avLst/>
-          </a:prstGeom>
-          <a:solidFill>
-            <a:schemeClr val="bg1"/>
-          </a:solidFill>
-          <a:ln>
-            <a:solidFill>
-              <a:schemeClr val="bg1"/>
-            </a:solidFill>
-          </a:ln>
-        </p:spPr>
-        <p:txBody>
-          <a:bodyPr wrap="square" rtlCol="0">
-            <a:spAutoFit/>
-          </a:bodyPr>
-          <a:lstStyle/>
-          <a:p>
-            <a:r>
-              <a:rPr lang="en-US" sz="3200" dirty="0">
-                <a:solidFill>
-                  <a:srgbClr val="4D4D4D"/>
-                </a:solidFill>
-                <a:latin typeface="Times New Roman" panose="02020603050405020304" pitchFamily="18" charset="0"/>
-                <a:cs typeface="Times New Roman" panose="02020603050405020304" pitchFamily="18" charset="0"/>
-              </a:rPr>
-              <a:t>Elevated NO</a:t>
-            </a:r>
-            <a:r>
-              <a:rPr lang="en-US" sz="3200" baseline="-25000" dirty="0">
-                <a:solidFill>
-                  <a:srgbClr val="4D4D4D"/>
-                </a:solidFill>
-                <a:latin typeface="Times New Roman" panose="02020603050405020304" pitchFamily="18" charset="0"/>
-                <a:cs typeface="Times New Roman" panose="02020603050405020304" pitchFamily="18" charset="0"/>
-              </a:rPr>
-              <a:t>3</a:t>
-            </a:r>
-            <a:endParaRPr lang="en-US" sz="3200" dirty="0">
-              <a:solidFill>
-                <a:srgbClr val="4D4D4D"/>
-              </a:solidFill>
-              <a:latin typeface="Times New Roman" panose="02020603050405020304" pitchFamily="18" charset="0"/>
-              <a:cs typeface="Times New Roman" panose="02020603050405020304" pitchFamily="18" charset="0"/>
-            </a:endParaRPr>
-          </a:p>
-        </p:txBody>
-      </p:sp>
-      <p:sp>
-        <p:nvSpPr>
-          <p:cNvPr id="5" name="Left Bracket 4">
-            <a:extLst>
-              <a:ext uri="{FF2B5EF4-FFF2-40B4-BE49-F238E27FC236}">
-                <a16:creationId xmlns:a16="http://schemas.microsoft.com/office/drawing/2014/main" id="{74BBD51B-941B-9A94-23BA-0386BFECF19B}"/>
+            <a:ln>
+              <a:noFill/>
+            </a:ln>
+          </p:spPr>
+          <p:style>
+            <a:lnRef idx="2">
+              <a:schemeClr val="accent1">
+                <a:shade val="15000"/>
+              </a:schemeClr>
+            </a:lnRef>
+            <a:fillRef idx="1">
+              <a:schemeClr val="accent1"/>
+            </a:fillRef>
+            <a:effectRef idx="0">
+              <a:schemeClr val="accent1"/>
+            </a:effectRef>
+            <a:fontRef idx="minor">
+              <a:schemeClr val="lt1"/>
+            </a:fontRef>
+          </p:style>
+          <p:txBody>
+            <a:bodyPr rtlCol="0" anchor="ctr"/>
+            <a:lstStyle/>
+            <a:p>
+              <a:pPr algn="ctr"/>
+              <a:endParaRPr lang="en-US"/>
+            </a:p>
+          </p:txBody>
+        </p:sp>
+      </p:grpSp>
+      <p:sp>
+        <p:nvSpPr>
+          <p:cNvPr id="4" name="Left Bracket 3">
+            <a:extLst>
+              <a:ext uri="{FF2B5EF4-FFF2-40B4-BE49-F238E27FC236}">
+                <a16:creationId xmlns:a16="http://schemas.microsoft.com/office/drawing/2014/main" id="{145ACA53-5D5B-22A6-788F-838A6801407C}"/>
               </a:ext>
             </a:extLst>
           </p:cNvPr>
@@ -4409,8 +4549,8 @@
         </p:nvSpPr>
         <p:spPr>
           <a:xfrm rot="16200000">
-            <a:off x="3972952" y="11111040"/>
-            <a:ext cx="457200" cy="2222078"/>
+            <a:off x="11334707" y="10243712"/>
+            <a:ext cx="457200" cy="3289386"/>
           </a:xfrm>
           <a:prstGeom prst="leftBracket">
             <a:avLst/>
@@ -4446,10 +4586,140 @@
       </p:sp>
       <p:sp>
         <p:nvSpPr>
-          <p:cNvPr id="4" name="Left Bracket 3">
-            <a:extLst>
-              <a:ext uri="{FF2B5EF4-FFF2-40B4-BE49-F238E27FC236}">
-                <a16:creationId xmlns:a16="http://schemas.microsoft.com/office/drawing/2014/main" id="{145ACA53-5D5B-22A6-788F-838A6801407C}"/>
+          <p:cNvPr id="9" name="TextBox 8">
+            <a:extLst>
+              <a:ext uri="{FF2B5EF4-FFF2-40B4-BE49-F238E27FC236}">
+                <a16:creationId xmlns:a16="http://schemas.microsoft.com/office/drawing/2014/main" id="{1F6A65C0-B033-182C-5422-2C2C3AF61F46}"/>
+              </a:ext>
+            </a:extLst>
+          </p:cNvPr>
+          <p:cNvSpPr txBox="1"/>
+          <p:nvPr/>
+        </p:nvSpPr>
+        <p:spPr>
+          <a:xfrm>
+            <a:off x="10265811" y="12228404"/>
+            <a:ext cx="2594992" cy="584775"/>
+          </a:xfrm>
+          <a:prstGeom prst="rect">
+            <a:avLst/>
+          </a:prstGeom>
+          <a:solidFill>
+            <a:schemeClr val="bg1"/>
+          </a:solidFill>
+          <a:ln>
+            <a:solidFill>
+              <a:schemeClr val="bg1"/>
+            </a:solidFill>
+          </a:ln>
+        </p:spPr>
+        <p:txBody>
+          <a:bodyPr wrap="square" rtlCol="0">
+            <a:spAutoFit/>
+          </a:bodyPr>
+          <a:lstStyle/>
+          <a:p>
+            <a:r>
+              <a:rPr lang="en-US" sz="3200" dirty="0">
+                <a:solidFill>
+                  <a:srgbClr val="4D4D4D"/>
+                </a:solidFill>
+                <a:latin typeface="Times New Roman" panose="02020603050405020304" pitchFamily="18" charset="0"/>
+                <a:cs typeface="Times New Roman" panose="02020603050405020304" pitchFamily="18" charset="0"/>
+              </a:rPr>
+              <a:t>Elevated NO</a:t>
+            </a:r>
+            <a:r>
+              <a:rPr lang="en-US" sz="3200" baseline="-25000" dirty="0">
+                <a:solidFill>
+                  <a:srgbClr val="4D4D4D"/>
+                </a:solidFill>
+                <a:latin typeface="Times New Roman" panose="02020603050405020304" pitchFamily="18" charset="0"/>
+                <a:cs typeface="Times New Roman" panose="02020603050405020304" pitchFamily="18" charset="0"/>
+              </a:rPr>
+              <a:t>3</a:t>
+            </a:r>
+            <a:endParaRPr lang="en-US" sz="3200" dirty="0">
+              <a:solidFill>
+                <a:srgbClr val="4D4D4D"/>
+              </a:solidFill>
+              <a:latin typeface="Times New Roman" panose="02020603050405020304" pitchFamily="18" charset="0"/>
+              <a:cs typeface="Times New Roman" panose="02020603050405020304" pitchFamily="18" charset="0"/>
+            </a:endParaRPr>
+          </a:p>
+        </p:txBody>
+      </p:sp>
+      <p:sp>
+        <p:nvSpPr>
+          <p:cNvPr id="7" name="TextBox 6">
+            <a:extLst>
+              <a:ext uri="{FF2B5EF4-FFF2-40B4-BE49-F238E27FC236}">
+                <a16:creationId xmlns:a16="http://schemas.microsoft.com/office/drawing/2014/main" id="{18530DF5-B2B7-B562-ADAA-7A51A225E70B}"/>
+              </a:ext>
+            </a:extLst>
+          </p:cNvPr>
+          <p:cNvSpPr txBox="1"/>
+          <p:nvPr/>
+        </p:nvSpPr>
+        <p:spPr>
+          <a:xfrm>
+            <a:off x="3705640" y="12144447"/>
+            <a:ext cx="3963442" cy="584775"/>
+          </a:xfrm>
+          <a:prstGeom prst="rect">
+            <a:avLst/>
+          </a:prstGeom>
+          <a:solidFill>
+            <a:schemeClr val="bg1"/>
+          </a:solidFill>
+          <a:ln>
+            <a:solidFill>
+              <a:schemeClr val="bg1"/>
+            </a:solidFill>
+          </a:ln>
+        </p:spPr>
+        <p:txBody>
+          <a:bodyPr wrap="square" rtlCol="0">
+            <a:spAutoFit/>
+          </a:bodyPr>
+          <a:lstStyle/>
+          <a:p>
+            <a:r>
+              <a:rPr lang="en-US" sz="3200" dirty="0">
+                <a:solidFill>
+                  <a:srgbClr val="4D4D4D"/>
+                </a:solidFill>
+                <a:latin typeface="Times New Roman" panose="02020603050405020304" pitchFamily="18" charset="0"/>
+                <a:cs typeface="Times New Roman" panose="02020603050405020304" pitchFamily="18" charset="0"/>
+              </a:rPr>
+              <a:t>Background NO</a:t>
+            </a:r>
+            <a:r>
+              <a:rPr lang="en-US" sz="3200" baseline="-25000" dirty="0">
+                <a:solidFill>
+                  <a:srgbClr val="4D4D4D"/>
+                </a:solidFill>
+                <a:latin typeface="Times New Roman" panose="02020603050405020304" pitchFamily="18" charset="0"/>
+                <a:cs typeface="Times New Roman" panose="02020603050405020304" pitchFamily="18" charset="0"/>
+              </a:rPr>
+              <a:t>3</a:t>
+            </a:r>
+            <a:endParaRPr lang="en-US" sz="3200" dirty="0">
+              <a:solidFill>
+                <a:srgbClr val="4D4D4D"/>
+              </a:solidFill>
+              <a:latin typeface="Times New Roman" panose="02020603050405020304" pitchFamily="18" charset="0"/>
+              <a:cs typeface="Times New Roman" panose="02020603050405020304" pitchFamily="18" charset="0"/>
+            </a:endParaRPr>
+          </a:p>
+        </p:txBody>
+      </p:sp>
+      <p:sp>
+        <p:nvSpPr>
+          <p:cNvPr id="12" name="Left Bracket 11">
+            <a:extLst>
+              <a:ext uri="{FF2B5EF4-FFF2-40B4-BE49-F238E27FC236}">
+                <a16:creationId xmlns:a16="http://schemas.microsoft.com/office/drawing/2014/main" id="{A8010EC9-A009-9653-C701-AFC330F7141E}"/>
               </a:ext>
             </a:extLst>
           </p:cNvPr>
@@ -4458,8 +4728,8 @@
         </p:nvSpPr>
         <p:spPr>
           <a:xfrm rot="16200000">
-            <a:off x="8446050" y="11154526"/>
-            <a:ext cx="457200" cy="2222076"/>
+            <a:off x="4951356" y="10243712"/>
+            <a:ext cx="457200" cy="3289386"/>
           </a:xfrm>
           <a:prstGeom prst="leftBracket">
             <a:avLst/>
@@ -4493,196 +4763,138 @@
           </a:p>
         </p:txBody>
       </p:sp>
+      <p:grpSp>
+        <p:nvGrpSpPr>
+          <p:cNvPr id="17" name="Group 16">
+            <a:extLst>
+              <a:ext uri="{FF2B5EF4-FFF2-40B4-BE49-F238E27FC236}">
+                <a16:creationId xmlns:a16="http://schemas.microsoft.com/office/drawing/2014/main" id="{49E3CA42-1D44-216C-F662-D690983E0768}"/>
+              </a:ext>
+            </a:extLst>
+          </p:cNvPr>
+          <p:cNvGrpSpPr/>
+          <p:nvPr/>
+        </p:nvGrpSpPr>
+        <p:grpSpPr>
+          <a:xfrm>
+            <a:off x="15143030" y="8063478"/>
+            <a:ext cx="2730500" cy="1168400"/>
+            <a:chOff x="15090538" y="8000651"/>
+            <a:chExt cx="2730500" cy="1168400"/>
+          </a:xfrm>
+        </p:grpSpPr>
+        <p:pic>
+          <p:nvPicPr>
+            <p:cNvPr id="16" name="Picture 15">
+              <a:extLst>
+                <a:ext uri="{FF2B5EF4-FFF2-40B4-BE49-F238E27FC236}">
+                  <a16:creationId xmlns:a16="http://schemas.microsoft.com/office/drawing/2014/main" id="{F305CE65-A93B-467D-F17A-F5670F668150}"/>
+                </a:ext>
+              </a:extLst>
+            </p:cNvPr>
+            <p:cNvPicPr>
+              <a:picLocks noChangeAspect="1"/>
+            </p:cNvPicPr>
+            <p:nvPr/>
+          </p:nvPicPr>
+          <p:blipFill>
+            <a:blip r:embed="rId4"/>
+            <a:stretch>
+              <a:fillRect/>
+            </a:stretch>
+          </p:blipFill>
+          <p:spPr>
+            <a:xfrm>
+              <a:off x="15090538" y="8000651"/>
+              <a:ext cx="2730500" cy="1168400"/>
+            </a:xfrm>
+            <a:prstGeom prst="rect">
+              <a:avLst/>
+            </a:prstGeom>
+          </p:spPr>
+        </p:pic>
+        <p:pic>
+          <p:nvPicPr>
+            <p:cNvPr id="15" name="Picture 14" descr="A graph of a number of different types of oxygen&#10;&#10;Description automatically generated with medium confidence">
+              <a:extLst>
+                <a:ext uri="{FF2B5EF4-FFF2-40B4-BE49-F238E27FC236}">
+                  <a16:creationId xmlns:a16="http://schemas.microsoft.com/office/drawing/2014/main" id="{363BE666-70C7-9754-1676-9C362456B30A}"/>
+                </a:ext>
+              </a:extLst>
+            </p:cNvPr>
+            <p:cNvPicPr>
+              <a:picLocks noChangeAspect="1"/>
+            </p:cNvPicPr>
+            <p:nvPr/>
+          </p:nvPicPr>
+          <p:blipFill>
+            <a:blip r:embed="rId2"/>
+            <a:srcRect l="79873" t="34917" r="17454" b="62917"/>
+            <a:stretch/>
+          </p:blipFill>
+          <p:spPr>
+            <a:xfrm rot="10800000">
+              <a:off x="15154898" y="8749678"/>
+              <a:ext cx="379562" cy="333555"/>
+            </a:xfrm>
+            <a:prstGeom prst="rect">
+              <a:avLst/>
+            </a:prstGeom>
+          </p:spPr>
+        </p:pic>
+      </p:grpSp>
+      <p:sp>
+        <p:nvSpPr>
+          <p:cNvPr id="18" name="TextBox 17">
+            <a:extLst>
+              <a:ext uri="{FF2B5EF4-FFF2-40B4-BE49-F238E27FC236}">
+                <a16:creationId xmlns:a16="http://schemas.microsoft.com/office/drawing/2014/main" id="{D0853AA5-EFD0-FE5D-F159-8410164E63B4}"/>
+              </a:ext>
+            </a:extLst>
+          </p:cNvPr>
+          <p:cNvSpPr txBox="1"/>
+          <p:nvPr/>
+        </p:nvSpPr>
+        <p:spPr>
+          <a:xfrm>
+            <a:off x="1534226" y="6516462"/>
+            <a:ext cx="7242150" cy="523220"/>
+          </a:xfrm>
+          <a:prstGeom prst="rect">
+            <a:avLst/>
+          </a:prstGeom>
+          <a:noFill/>
+        </p:spPr>
+        <p:txBody>
+          <a:bodyPr rot="0" spcFirstLastPara="0" vertOverflow="overflow" horzOverflow="overflow" vert="horz" wrap="square" lIns="91440" tIns="45720" rIns="91440" bIns="45720" numCol="1" spcCol="0" rtlCol="0" fromWordArt="0" anchor="t" anchorCtr="0" forceAA="0" compatLnSpc="1">
+            <a:prstTxWarp prst="textNoShape">
+              <a:avLst/>
+            </a:prstTxWarp>
+            <a:spAutoFit/>
+          </a:bodyPr>
+          <a:lstStyle/>
+          <a:p>
+            <a:pPr algn="l"/>
+            <a:r>
+              <a:rPr lang="en-US" sz="2800" dirty="0">
+                <a:ln/>
+                <a:solidFill>
+                  <a:srgbClr val="3B3B3B"/>
+                </a:solidFill>
+                <a:latin typeface="Times New Roman" panose="02020603050405020304" pitchFamily="18" charset="0"/>
+                <a:cs typeface="Times New Roman" panose="02020603050405020304" pitchFamily="18" charset="0"/>
+                <a:sym typeface="Arial"/>
+                <a:rtl val="0"/>
+              </a:rPr>
+              <a:t>B) Feeding treatment: fed versus starved</a:t>
+            </a:r>
+          </a:p>
+        </p:txBody>
+      </p:sp>
     </p:spTree>
     <p:extLst>
       <p:ext uri="{BB962C8B-B14F-4D97-AF65-F5344CB8AC3E}">
         <p14:creationId xmlns:p14="http://schemas.microsoft.com/office/powerpoint/2010/main" val="1978814077"/>
-      </p:ext>
-    </p:extLst>
-  </p:cSld>
-  <p:clrMapOvr>
-    <a:masterClrMapping/>
-  </p:clrMapOvr>
-</p:sld>
-</file>
-
-<file path=ppt/slides/slide2.xml><?xml version="1.0" encoding="utf-8"?>
-<p:sld xmlns:a="http://schemas.openxmlformats.org/drawingml/2006/main" xmlns:r="http://schemas.openxmlformats.org/officeDocument/2006/relationships" xmlns:p="http://schemas.openxmlformats.org/presentationml/2006/main">
-  <p:cSld>
-    <p:spTree>
-      <p:nvGrpSpPr>
-        <p:cNvPr id="1" name=""/>
-        <p:cNvGrpSpPr/>
-        <p:nvPr/>
-      </p:nvGrpSpPr>
-      <p:grpSpPr>
-        <a:xfrm>
-          <a:off x="0" y="0"/>
-          <a:ext cx="0" cy="0"/>
-          <a:chOff x="0" y="0"/>
-          <a:chExt cx="0" cy="0"/>
-        </a:xfrm>
-      </p:grpSpPr>
-      <p:pic>
-        <p:nvPicPr>
-          <p:cNvPr id="7" name="Picture 6" descr="A graph of a number of different levels of temperature&#10;&#10;Description automatically generated with medium confidence">
-            <a:extLst>
-              <a:ext uri="{FF2B5EF4-FFF2-40B4-BE49-F238E27FC236}">
-                <a16:creationId xmlns:a16="http://schemas.microsoft.com/office/drawing/2014/main" id="{06AD32C1-38C1-2C69-0469-204E6336BEA9}"/>
-              </a:ext>
-            </a:extLst>
-          </p:cNvPr>
-          <p:cNvPicPr>
-            <a:picLocks noChangeAspect="1"/>
-          </p:cNvPicPr>
-          <p:nvPr/>
-        </p:nvPicPr>
-        <p:blipFill>
-          <a:blip r:embed="rId2"/>
-          <a:srcRect t="4631"/>
-          <a:stretch/>
-        </p:blipFill>
-        <p:spPr>
-          <a:xfrm>
-            <a:off x="2019299" y="3505200"/>
-            <a:ext cx="13468214" cy="8763000"/>
-          </a:xfrm>
-          <a:prstGeom prst="rect">
-            <a:avLst/>
-          </a:prstGeom>
-        </p:spPr>
-      </p:pic>
-      <p:sp>
-        <p:nvSpPr>
-          <p:cNvPr id="8" name="TextBox 7">
-            <a:extLst>
-              <a:ext uri="{FF2B5EF4-FFF2-40B4-BE49-F238E27FC236}">
-                <a16:creationId xmlns:a16="http://schemas.microsoft.com/office/drawing/2014/main" id="{4F23DD90-BA99-9852-E00E-F9D9577167F3}"/>
-              </a:ext>
-            </a:extLst>
-          </p:cNvPr>
-          <p:cNvSpPr txBox="1"/>
-          <p:nvPr/>
-        </p:nvSpPr>
-        <p:spPr>
-          <a:xfrm rot="16200000">
-            <a:off x="-2990875" y="7814280"/>
-            <a:ext cx="8904659" cy="584775"/>
-          </a:xfrm>
-          <a:prstGeom prst="rect">
-            <a:avLst/>
-          </a:prstGeom>
-          <a:solidFill>
-            <a:schemeClr val="bg1"/>
-          </a:solidFill>
-          <a:ln>
-            <a:solidFill>
-              <a:schemeClr val="bg1"/>
-            </a:solidFill>
-          </a:ln>
-        </p:spPr>
-        <p:txBody>
-          <a:bodyPr wrap="square" rtlCol="0">
-            <a:spAutoFit/>
-          </a:bodyPr>
-          <a:lstStyle/>
-          <a:p>
-            <a:pPr algn="ctr"/>
-            <a:r>
-              <a:rPr lang="en-US" sz="3200" dirty="0">
-                <a:solidFill>
-                  <a:srgbClr val="4D4D4D"/>
-                </a:solidFill>
-                <a:latin typeface="Times New Roman" panose="02020603050405020304" pitchFamily="18" charset="0"/>
-                <a:cs typeface="Times New Roman" panose="02020603050405020304" pitchFamily="18" charset="0"/>
-              </a:rPr>
-              <a:t>Average polyp extension score</a:t>
-            </a:r>
-          </a:p>
-        </p:txBody>
-      </p:sp>
-      <p:sp>
-        <p:nvSpPr>
-          <p:cNvPr id="9" name="TextBox 8">
-            <a:extLst>
-              <a:ext uri="{FF2B5EF4-FFF2-40B4-BE49-F238E27FC236}">
-                <a16:creationId xmlns:a16="http://schemas.microsoft.com/office/drawing/2014/main" id="{3D4800F3-93C2-14B5-BD42-8D8D72982070}"/>
-              </a:ext>
-            </a:extLst>
-          </p:cNvPr>
-          <p:cNvSpPr txBox="1"/>
-          <p:nvPr/>
-        </p:nvSpPr>
-        <p:spPr>
-          <a:xfrm>
-            <a:off x="2870520" y="12427032"/>
-            <a:ext cx="8904659" cy="584775"/>
-          </a:xfrm>
-          <a:prstGeom prst="rect">
-            <a:avLst/>
-          </a:prstGeom>
-          <a:solidFill>
-            <a:schemeClr val="bg1"/>
-          </a:solidFill>
-          <a:ln>
-            <a:solidFill>
-              <a:schemeClr val="bg1"/>
-            </a:solidFill>
-          </a:ln>
-        </p:spPr>
-        <p:txBody>
-          <a:bodyPr wrap="square" rtlCol="0">
-            <a:spAutoFit/>
-          </a:bodyPr>
-          <a:lstStyle/>
-          <a:p>
-            <a:pPr algn="ctr"/>
-            <a:r>
-              <a:rPr lang="en-US" sz="3200" dirty="0">
-                <a:solidFill>
-                  <a:srgbClr val="4D4D4D"/>
-                </a:solidFill>
-                <a:latin typeface="Times New Roman" panose="02020603050405020304" pitchFamily="18" charset="0"/>
-                <a:cs typeface="Times New Roman" panose="02020603050405020304" pitchFamily="18" charset="0"/>
-              </a:rPr>
-              <a:t>Day of experiment</a:t>
-            </a:r>
-          </a:p>
-        </p:txBody>
-      </p:sp>
-      <p:pic>
-        <p:nvPicPr>
-          <p:cNvPr id="10" name="Picture 9" descr="A graph of a number of different levels of temperature&#10;&#10;Description automatically generated with medium confidence">
-            <a:extLst>
-              <a:ext uri="{FF2B5EF4-FFF2-40B4-BE49-F238E27FC236}">
-                <a16:creationId xmlns:a16="http://schemas.microsoft.com/office/drawing/2014/main" id="{67A79C09-97FC-93F0-0A2B-6BF5F4505423}"/>
-              </a:ext>
-            </a:extLst>
-          </p:cNvPr>
-          <p:cNvPicPr>
-            <a:picLocks noChangeAspect="1"/>
-          </p:cNvPicPr>
-          <p:nvPr/>
-        </p:nvPicPr>
-        <p:blipFill>
-          <a:blip r:embed="rId2"/>
-          <a:srcRect l="77809" t="34108" b="33392"/>
-          <a:stretch/>
-        </p:blipFill>
-        <p:spPr>
-          <a:xfrm>
-            <a:off x="12640569" y="6191179"/>
-            <a:ext cx="3393898" cy="3391041"/>
-          </a:xfrm>
-          <a:prstGeom prst="rect">
-            <a:avLst/>
-          </a:prstGeom>
-        </p:spPr>
-      </p:pic>
-    </p:spTree>
-    <p:extLst>
-      <p:ext uri="{BB962C8B-B14F-4D97-AF65-F5344CB8AC3E}">
-        <p14:creationId xmlns:p14="http://schemas.microsoft.com/office/powerpoint/2010/main" val="3685343335"/>
       </p:ext>
     </p:extLst>
   </p:cSld>
@@ -4697,7 +4909,13 @@
   <p:cSld>
     <p:spTree>
       <p:nvGrpSpPr>
-        <p:cNvPr id="1" name=""/>
+        <p:cNvPr id="1" name="">
+          <a:extLst>
+            <a:ext uri="{FF2B5EF4-FFF2-40B4-BE49-F238E27FC236}">
+              <a16:creationId xmlns:a16="http://schemas.microsoft.com/office/drawing/2014/main" id="{0BFC0483-26C4-F7CA-8643-E6750D79C6EB}"/>
+            </a:ext>
+          </a:extLst>
+        </p:cNvPr>
         <p:cNvGrpSpPr/>
         <p:nvPr/>
       </p:nvGrpSpPr>
@@ -4711,10 +4929,10 @@
       </p:grpSpPr>
       <p:pic>
         <p:nvPicPr>
-          <p:cNvPr id="18" name="Picture 17" descr="A graph of a graph of a number of points&#10;&#10;Description automatically generated with medium confidence">
-            <a:extLst>
-              <a:ext uri="{FF2B5EF4-FFF2-40B4-BE49-F238E27FC236}">
-                <a16:creationId xmlns:a16="http://schemas.microsoft.com/office/drawing/2014/main" id="{BF768A5C-10C6-2443-21DE-83BDDB9EB31C}"/>
+          <p:cNvPr id="11" name="Picture 10" descr="A diagram of different sizes and colors&#10;&#10;Description automatically generated with medium confidence">
+            <a:extLst>
+              <a:ext uri="{FF2B5EF4-FFF2-40B4-BE49-F238E27FC236}">
+                <a16:creationId xmlns:a16="http://schemas.microsoft.com/office/drawing/2014/main" id="{42EEAD16-6CC5-A027-01B5-3B7EC7B3AA70}"/>
               </a:ext>
             </a:extLst>
           </p:cNvPr>
@@ -4725,13 +4943,13 @@
         </p:nvPicPr>
         <p:blipFill>
           <a:blip r:embed="rId3"/>
-          <a:srcRect l="21209" r="35803" b="4787"/>
+          <a:srcRect l="18855" r="39048"/>
           <a:stretch/>
         </p:blipFill>
         <p:spPr>
           <a:xfrm>
-            <a:off x="1541837" y="4055765"/>
-            <a:ext cx="8582914" cy="12223320"/>
+            <a:off x="1283892" y="4129391"/>
+            <a:ext cx="8743579" cy="12606894"/>
           </a:xfrm>
           <a:prstGeom prst="rect">
             <a:avLst/>
@@ -4743,7 +4961,7 @@
           <p:cNvPr id="14" name="TextBox 13">
             <a:extLst>
               <a:ext uri="{FF2B5EF4-FFF2-40B4-BE49-F238E27FC236}">
-                <a16:creationId xmlns:a16="http://schemas.microsoft.com/office/drawing/2014/main" id="{40FAE2D1-A10E-81A2-2F57-D4B7A7FF1AC7}"/>
+                <a16:creationId xmlns:a16="http://schemas.microsoft.com/office/drawing/2014/main" id="{55EEDE2A-9537-211D-17EB-CBE59B102D4A}"/>
               </a:ext>
             </a:extLst>
           </p:cNvPr>
@@ -4752,7 +4970,7 @@
         </p:nvSpPr>
         <p:spPr>
           <a:xfrm>
-            <a:off x="2901404" y="16783093"/>
+            <a:off x="2523187" y="17075481"/>
             <a:ext cx="3963442" cy="584775"/>
           </a:xfrm>
           <a:prstGeom prst="rect">
@@ -4773,6 +4991,7 @@
           </a:bodyPr>
           <a:lstStyle/>
           <a:p>
+            <a:pPr algn="ctr"/>
             <a:r>
               <a:rPr lang="en-US" sz="3200" dirty="0">
                 <a:solidFill>
@@ -4808,7 +5027,7 @@
           <p:cNvPr id="12" name="Rectangle 11">
             <a:extLst>
               <a:ext uri="{FF2B5EF4-FFF2-40B4-BE49-F238E27FC236}">
-                <a16:creationId xmlns:a16="http://schemas.microsoft.com/office/drawing/2014/main" id="{A0B6A5A2-CB7B-52CB-C6C6-2D37F9DB30FE}"/>
+                <a16:creationId xmlns:a16="http://schemas.microsoft.com/office/drawing/2014/main" id="{41BCF189-78CD-214D-8D85-9AA5E7FF7217}"/>
               </a:ext>
             </a:extLst>
           </p:cNvPr>
@@ -4862,7 +5081,7 @@
           <p:cNvPr id="10" name="TextBox 9">
             <a:extLst>
               <a:ext uri="{FF2B5EF4-FFF2-40B4-BE49-F238E27FC236}">
-                <a16:creationId xmlns:a16="http://schemas.microsoft.com/office/drawing/2014/main" id="{B1497C62-6DD4-691B-D883-7C6AB4CE0CC1}"/>
+                <a16:creationId xmlns:a16="http://schemas.microsoft.com/office/drawing/2014/main" id="{420670DF-87D6-591D-976C-C02F3719C065}"/>
               </a:ext>
             </a:extLst>
           </p:cNvPr>
@@ -4901,46 +5120,17 @@
                 <a:latin typeface="Times New Roman" panose="02020603050405020304" pitchFamily="18" charset="0"/>
                 <a:cs typeface="Times New Roman" panose="02020603050405020304" pitchFamily="18" charset="0"/>
               </a:rPr>
-              <a:t>Photosynthetic efficiency (Fv/Fm)</a:t>
-            </a:r>
-          </a:p>
-        </p:txBody>
-      </p:sp>
-      <p:pic>
-        <p:nvPicPr>
-          <p:cNvPr id="2" name="Picture 1" descr="A graph of a number of different types of oxygen&#10;&#10;Description automatically generated with medium confidence">
-            <a:extLst>
-              <a:ext uri="{FF2B5EF4-FFF2-40B4-BE49-F238E27FC236}">
-                <a16:creationId xmlns:a16="http://schemas.microsoft.com/office/drawing/2014/main" id="{7849AF67-6A09-CCAE-6915-4D5D63902ADC}"/>
-              </a:ext>
-            </a:extLst>
-          </p:cNvPr>
-          <p:cNvPicPr>
-            <a:picLocks noChangeAspect="1"/>
-          </p:cNvPicPr>
-          <p:nvPr/>
-        </p:nvPicPr>
-        <p:blipFill>
-          <a:blip r:embed="rId4"/>
-          <a:srcRect l="79007" t="38202" r="1545" b="53405"/>
-          <a:stretch/>
-        </p:blipFill>
-        <p:spPr>
-          <a:xfrm>
-            <a:off x="9881640" y="8875073"/>
-            <a:ext cx="2761487" cy="1292352"/>
-          </a:xfrm>
-          <a:prstGeom prst="rect">
-            <a:avLst/>
-          </a:prstGeom>
-        </p:spPr>
-      </p:pic>
+              <a:t>Red Channel Value</a:t>
+            </a:r>
+          </a:p>
+        </p:txBody>
+      </p:sp>
       <p:sp>
         <p:nvSpPr>
           <p:cNvPr id="28" name="TextBox 27">
             <a:extLst>
               <a:ext uri="{FF2B5EF4-FFF2-40B4-BE49-F238E27FC236}">
-                <a16:creationId xmlns:a16="http://schemas.microsoft.com/office/drawing/2014/main" id="{CEADE54F-6B87-FC04-0136-F60605695D89}"/>
+                <a16:creationId xmlns:a16="http://schemas.microsoft.com/office/drawing/2014/main" id="{1FA58596-D9E5-2176-88D0-597D3523FEBE}"/>
               </a:ext>
             </a:extLst>
           </p:cNvPr>
@@ -4949,8 +5139,8 @@
         </p:nvSpPr>
         <p:spPr>
           <a:xfrm>
-            <a:off x="2483058" y="3486827"/>
-            <a:ext cx="5486464" cy="523220"/>
+            <a:off x="2483058" y="3606725"/>
+            <a:ext cx="8007142" cy="523220"/>
           </a:xfrm>
           <a:prstGeom prst="rect">
             <a:avLst/>
@@ -4980,7 +5170,7 @@
                 <a:sym typeface="Arial"/>
                 <a:rtl val="0"/>
               </a:rPr>
-              <a:t>Aposymbiotic corals</a:t>
+              <a:t>Symbiotic state: symbiotic vs. aposymbiotic</a:t>
             </a:r>
           </a:p>
         </p:txBody>
@@ -4990,7 +5180,7 @@
           <p:cNvPr id="29" name="TextBox 28">
             <a:extLst>
               <a:ext uri="{FF2B5EF4-FFF2-40B4-BE49-F238E27FC236}">
-                <a16:creationId xmlns:a16="http://schemas.microsoft.com/office/drawing/2014/main" id="{C6295C76-6CE9-9580-75E4-F5AF2C15B9ED}"/>
+                <a16:creationId xmlns:a16="http://schemas.microsoft.com/office/drawing/2014/main" id="{73F76602-BF21-56CE-B9CD-5407C185215D}"/>
               </a:ext>
             </a:extLst>
           </p:cNvPr>
@@ -4999,8 +5189,8 @@
         </p:nvSpPr>
         <p:spPr>
           <a:xfrm>
-            <a:off x="2483058" y="9755747"/>
-            <a:ext cx="3548032" cy="523220"/>
+            <a:off x="2483058" y="10126084"/>
+            <a:ext cx="8007142" cy="523220"/>
           </a:xfrm>
           <a:prstGeom prst="rect">
             <a:avLst/>
@@ -5028,7 +5218,7 @@
                 <a:sym typeface="Arial"/>
                 <a:rtl val="0"/>
               </a:rPr>
-              <a:t>B) Symbiotic corals</a:t>
+              <a:t>B) Feeding treatment: fed vs. starved</a:t>
             </a:r>
           </a:p>
         </p:txBody>
@@ -5038,7 +5228,7 @@
           <p:cNvPr id="5" name="TextBox 4">
             <a:extLst>
               <a:ext uri="{FF2B5EF4-FFF2-40B4-BE49-F238E27FC236}">
-                <a16:creationId xmlns:a16="http://schemas.microsoft.com/office/drawing/2014/main" id="{E3F4C998-153B-9FC6-2A2A-E6DE57C5B93A}"/>
+                <a16:creationId xmlns:a16="http://schemas.microsoft.com/office/drawing/2014/main" id="{90B9E7D1-05E9-74D6-5A76-C755578482FE}"/>
               </a:ext>
             </a:extLst>
           </p:cNvPr>
@@ -5047,7 +5237,7 @@
         </p:nvSpPr>
         <p:spPr>
           <a:xfrm>
-            <a:off x="6672026" y="16784185"/>
+            <a:off x="6672026" y="17037320"/>
             <a:ext cx="2594992" cy="584775"/>
           </a:xfrm>
           <a:prstGeom prst="rect">
@@ -5103,7 +5293,7 @@
           <p:cNvPr id="6" name="Left Bracket 5">
             <a:extLst>
               <a:ext uri="{FF2B5EF4-FFF2-40B4-BE49-F238E27FC236}">
-                <a16:creationId xmlns:a16="http://schemas.microsoft.com/office/drawing/2014/main" id="{9C51E2D2-3DA2-D747-F759-6226623287B5}"/>
+                <a16:creationId xmlns:a16="http://schemas.microsoft.com/office/drawing/2014/main" id="{93E9BB2E-4570-DD95-2917-353746CC98EC}"/>
               </a:ext>
             </a:extLst>
           </p:cNvPr>
@@ -5112,7 +5302,7 @@
         </p:nvSpPr>
         <p:spPr>
           <a:xfrm rot="16200000">
-            <a:off x="7554464" y="15396647"/>
+            <a:off x="7544579" y="15695367"/>
             <a:ext cx="457200" cy="2222076"/>
           </a:xfrm>
           <a:prstGeom prst="leftBracket">
@@ -5152,7 +5342,7 @@
           <p:cNvPr id="15" name="Left Bracket 14">
             <a:extLst>
               <a:ext uri="{FF2B5EF4-FFF2-40B4-BE49-F238E27FC236}">
-                <a16:creationId xmlns:a16="http://schemas.microsoft.com/office/drawing/2014/main" id="{3318E1A0-A4D7-89A5-57D1-E40AC16241C3}"/>
+                <a16:creationId xmlns:a16="http://schemas.microsoft.com/office/drawing/2014/main" id="{ADEAF51A-E602-8645-FBF1-0120C0821627}"/>
               </a:ext>
             </a:extLst>
           </p:cNvPr>
@@ -5161,7 +5351,7 @@
         </p:nvSpPr>
         <p:spPr>
           <a:xfrm rot="16200000">
-            <a:off x="4137544" y="15397737"/>
+            <a:off x="4179249" y="15697681"/>
             <a:ext cx="457200" cy="2222078"/>
           </a:xfrm>
           <a:prstGeom prst="leftBracket">
@@ -5196,10 +5386,148 @@
           </a:p>
         </p:txBody>
       </p:sp>
+      <p:pic>
+        <p:nvPicPr>
+          <p:cNvPr id="13" name="Picture 12" descr="A graph of a number of different types of oxygen&#10;&#10;Description automatically generated with medium confidence">
+            <a:extLst>
+              <a:ext uri="{FF2B5EF4-FFF2-40B4-BE49-F238E27FC236}">
+                <a16:creationId xmlns:a16="http://schemas.microsoft.com/office/drawing/2014/main" id="{2EF961F1-43BD-45DF-BF06-F5879DB2BFE7}"/>
+              </a:ext>
+            </a:extLst>
+          </p:cNvPr>
+          <p:cNvPicPr>
+            <a:picLocks noChangeAspect="1"/>
+          </p:cNvPicPr>
+          <p:nvPr/>
+        </p:nvPicPr>
+        <p:blipFill>
+          <a:blip r:embed="rId4"/>
+          <a:srcRect l="79007" t="38202" r="1545" b="53405"/>
+          <a:stretch/>
+        </p:blipFill>
+        <p:spPr>
+          <a:xfrm>
+            <a:off x="10124795" y="8347673"/>
+            <a:ext cx="2761487" cy="1292352"/>
+          </a:xfrm>
+          <a:prstGeom prst="rect">
+            <a:avLst/>
+          </a:prstGeom>
+        </p:spPr>
+      </p:pic>
+      <p:pic>
+        <p:nvPicPr>
+          <p:cNvPr id="16" name="Picture 15" descr="A graph of a number of different types of oxygen&#10;&#10;Description automatically generated with medium confidence">
+            <a:extLst>
+              <a:ext uri="{FF2B5EF4-FFF2-40B4-BE49-F238E27FC236}">
+                <a16:creationId xmlns:a16="http://schemas.microsoft.com/office/drawing/2014/main" id="{C0EE2963-FC6E-A0E8-7F76-986CF6215EDE}"/>
+              </a:ext>
+            </a:extLst>
+          </p:cNvPr>
+          <p:cNvPicPr>
+            <a:picLocks noChangeAspect="1"/>
+          </p:cNvPicPr>
+          <p:nvPr/>
+        </p:nvPicPr>
+        <p:blipFill>
+          <a:blip r:embed="rId4"/>
+          <a:srcRect l="77753" t="29413" b="62194"/>
+          <a:stretch/>
+        </p:blipFill>
+        <p:spPr>
+          <a:xfrm>
+            <a:off x="9926078" y="6997622"/>
+            <a:ext cx="3158922" cy="1292352"/>
+          </a:xfrm>
+          <a:prstGeom prst="rect">
+            <a:avLst/>
+          </a:prstGeom>
+        </p:spPr>
+      </p:pic>
+      <p:grpSp>
+        <p:nvGrpSpPr>
+          <p:cNvPr id="17" name="Group 16">
+            <a:extLst>
+              <a:ext uri="{FF2B5EF4-FFF2-40B4-BE49-F238E27FC236}">
+                <a16:creationId xmlns:a16="http://schemas.microsoft.com/office/drawing/2014/main" id="{88CF00F9-1A16-0167-A049-A3473A19D450}"/>
+              </a:ext>
+            </a:extLst>
+          </p:cNvPr>
+          <p:cNvGrpSpPr/>
+          <p:nvPr/>
+        </p:nvGrpSpPr>
+        <p:grpSpPr>
+          <a:xfrm>
+            <a:off x="10239647" y="9803494"/>
+            <a:ext cx="2730500" cy="1168400"/>
+            <a:chOff x="15090538" y="8000651"/>
+            <a:chExt cx="2730500" cy="1168400"/>
+          </a:xfrm>
+        </p:grpSpPr>
+        <p:pic>
+          <p:nvPicPr>
+            <p:cNvPr id="19" name="Picture 18">
+              <a:extLst>
+                <a:ext uri="{FF2B5EF4-FFF2-40B4-BE49-F238E27FC236}">
+                  <a16:creationId xmlns:a16="http://schemas.microsoft.com/office/drawing/2014/main" id="{AA910B2D-0E42-1E35-C276-D4DB6CAA3F3F}"/>
+                </a:ext>
+              </a:extLst>
+            </p:cNvPr>
+            <p:cNvPicPr>
+              <a:picLocks noChangeAspect="1"/>
+            </p:cNvPicPr>
+            <p:nvPr/>
+          </p:nvPicPr>
+          <p:blipFill>
+            <a:blip r:embed="rId5"/>
+            <a:stretch>
+              <a:fillRect/>
+            </a:stretch>
+          </p:blipFill>
+          <p:spPr>
+            <a:xfrm>
+              <a:off x="15090538" y="8000651"/>
+              <a:ext cx="2730500" cy="1168400"/>
+            </a:xfrm>
+            <a:prstGeom prst="rect">
+              <a:avLst/>
+            </a:prstGeom>
+          </p:spPr>
+        </p:pic>
+        <p:pic>
+          <p:nvPicPr>
+            <p:cNvPr id="20" name="Picture 19" descr="A graph of a number of different types of oxygen&#10;&#10;Description automatically generated with medium confidence">
+              <a:extLst>
+                <a:ext uri="{FF2B5EF4-FFF2-40B4-BE49-F238E27FC236}">
+                  <a16:creationId xmlns:a16="http://schemas.microsoft.com/office/drawing/2014/main" id="{D11F9E53-4AA6-C151-ABB5-953BD611889B}"/>
+                </a:ext>
+              </a:extLst>
+            </p:cNvPr>
+            <p:cNvPicPr>
+              <a:picLocks noChangeAspect="1"/>
+            </p:cNvPicPr>
+            <p:nvPr/>
+          </p:nvPicPr>
+          <p:blipFill>
+            <a:blip r:embed="rId4"/>
+            <a:srcRect l="79873" t="34917" r="17454" b="62917"/>
+            <a:stretch/>
+          </p:blipFill>
+          <p:spPr>
+            <a:xfrm rot="10800000">
+              <a:off x="15154898" y="8749678"/>
+              <a:ext cx="379562" cy="333555"/>
+            </a:xfrm>
+            <a:prstGeom prst="rect">
+              <a:avLst/>
+            </a:prstGeom>
+          </p:spPr>
+        </p:pic>
+      </p:grpSp>
     </p:spTree>
     <p:extLst>
       <p:ext uri="{BB962C8B-B14F-4D97-AF65-F5344CB8AC3E}">
-        <p14:creationId xmlns:p14="http://schemas.microsoft.com/office/powerpoint/2010/main" val="598337248"/>
+        <p14:creationId xmlns:p14="http://schemas.microsoft.com/office/powerpoint/2010/main" val="1886712999"/>
       </p:ext>
     </p:extLst>
   </p:cSld>
@@ -5226,6 +5554,35 @@
           <a:chExt cx="0" cy="0"/>
         </a:xfrm>
       </p:grpSpPr>
+      <p:pic>
+        <p:nvPicPr>
+          <p:cNvPr id="18" name="Picture 17" descr="A graph of a graph of a number of points&#10;&#10;Description automatically generated with medium confidence">
+            <a:extLst>
+              <a:ext uri="{FF2B5EF4-FFF2-40B4-BE49-F238E27FC236}">
+                <a16:creationId xmlns:a16="http://schemas.microsoft.com/office/drawing/2014/main" id="{BF768A5C-10C6-2443-21DE-83BDDB9EB31C}"/>
+              </a:ext>
+            </a:extLst>
+          </p:cNvPr>
+          <p:cNvPicPr>
+            <a:picLocks noChangeAspect="1"/>
+          </p:cNvPicPr>
+          <p:nvPr/>
+        </p:nvPicPr>
+        <p:blipFill>
+          <a:blip r:embed="rId3"/>
+          <a:srcRect l="21209" r="35803" b="4787"/>
+          <a:stretch/>
+        </p:blipFill>
+        <p:spPr>
+          <a:xfrm>
+            <a:off x="1541837" y="4055765"/>
+            <a:ext cx="8582914" cy="12223320"/>
+          </a:xfrm>
+          <a:prstGeom prst="rect">
+            <a:avLst/>
+          </a:prstGeom>
+        </p:spPr>
+      </p:pic>
       <p:sp>
         <p:nvSpPr>
           <p:cNvPr id="14" name="TextBox 13">
@@ -5291,35 +5648,6 @@
           </a:p>
         </p:txBody>
       </p:sp>
-      <p:pic>
-        <p:nvPicPr>
-          <p:cNvPr id="4" name="Picture 3" descr="A diagram of different types of symbiotic state&#10;&#10;Description automatically generated">
-            <a:extLst>
-              <a:ext uri="{FF2B5EF4-FFF2-40B4-BE49-F238E27FC236}">
-                <a16:creationId xmlns:a16="http://schemas.microsoft.com/office/drawing/2014/main" id="{00A3B1C3-C277-9D37-5352-2DB6B5ED247C}"/>
-              </a:ext>
-            </a:extLst>
-          </p:cNvPr>
-          <p:cNvPicPr>
-            <a:picLocks noChangeAspect="1"/>
-          </p:cNvPicPr>
-          <p:nvPr/>
-        </p:nvPicPr>
-        <p:blipFill>
-          <a:blip r:embed="rId3"/>
-          <a:srcRect l="7997" t="47554" r="30230"/>
-          <a:stretch/>
-        </p:blipFill>
-        <p:spPr>
-          <a:xfrm>
-            <a:off x="1501450" y="9755747"/>
-            <a:ext cx="8352137" cy="6530530"/>
-          </a:xfrm>
-          <a:prstGeom prst="rect">
-            <a:avLst/>
-          </a:prstGeom>
-        </p:spPr>
-      </p:pic>
       <p:sp>
         <p:nvSpPr>
           <p:cNvPr id="12" name="Rectangle 11">
@@ -5388,8 +5716,8 @@
         </p:nvSpPr>
         <p:spPr>
           <a:xfrm rot="16200000">
-            <a:off x="-2607978" y="12991819"/>
-            <a:ext cx="8218858" cy="523220"/>
+            <a:off x="-5616070" y="10095307"/>
+            <a:ext cx="13960348" cy="584775"/>
           </a:xfrm>
           <a:prstGeom prst="rect">
             <a:avLst/>
@@ -5411,7 +5739,7 @@
           <a:p>
             <a:pPr algn="ctr"/>
             <a:r>
-              <a:rPr lang="en-US" sz="2800" dirty="0">
+              <a:rPr lang="en-US" sz="3200" dirty="0">
                 <a:solidFill>
                   <a:srgbClr val="4D4D4D"/>
                 </a:solidFill>
@@ -5444,7 +5772,7 @@
         </p:blipFill>
         <p:spPr>
           <a:xfrm>
-            <a:off x="9853587" y="12102472"/>
+            <a:off x="9881640" y="8875073"/>
             <a:ext cx="2761487" cy="1292352"/>
           </a:xfrm>
           <a:prstGeom prst="rect">
@@ -5452,35 +5780,104 @@
           </a:prstGeom>
         </p:spPr>
       </p:pic>
-      <p:pic>
-        <p:nvPicPr>
-          <p:cNvPr id="9" name="Picture 8" descr="A graph of a number of different types of oxygen&#10;&#10;Description automatically generated with medium confidence">
-            <a:extLst>
-              <a:ext uri="{FF2B5EF4-FFF2-40B4-BE49-F238E27FC236}">
-                <a16:creationId xmlns:a16="http://schemas.microsoft.com/office/drawing/2014/main" id="{A60BC6E7-D092-3257-C377-8695B9F334B4}"/>
-              </a:ext>
-            </a:extLst>
-          </p:cNvPr>
-          <p:cNvPicPr>
-            <a:picLocks noChangeAspect="1"/>
-          </p:cNvPicPr>
+      <p:sp>
+        <p:nvSpPr>
+          <p:cNvPr id="28" name="TextBox 27">
+            <a:extLst>
+              <a:ext uri="{FF2B5EF4-FFF2-40B4-BE49-F238E27FC236}">
+                <a16:creationId xmlns:a16="http://schemas.microsoft.com/office/drawing/2014/main" id="{CEADE54F-6B87-FC04-0136-F60605695D89}"/>
+              </a:ext>
+            </a:extLst>
+          </p:cNvPr>
+          <p:cNvSpPr txBox="1"/>
           <p:nvPr/>
-        </p:nvPicPr>
-        <p:blipFill>
-          <a:blip r:embed="rId4"/>
-          <a:srcRect l="77753" t="47585" b="42914"/>
-          <a:stretch/>
-        </p:blipFill>
-        <p:spPr>
-          <a:xfrm>
-            <a:off x="9654870" y="13671807"/>
-            <a:ext cx="3158922" cy="1463040"/>
+        </p:nvSpPr>
+        <p:spPr>
+          <a:xfrm>
+            <a:off x="2483058" y="3486827"/>
+            <a:ext cx="5486464" cy="523220"/>
           </a:xfrm>
           <a:prstGeom prst="rect">
             <a:avLst/>
           </a:prstGeom>
-        </p:spPr>
-      </p:pic>
+          <a:noFill/>
+        </p:spPr>
+        <p:txBody>
+          <a:bodyPr rot="0" spcFirstLastPara="0" vertOverflow="overflow" horzOverflow="overflow" vert="horz" wrap="square" lIns="91440" tIns="45720" rIns="91440" bIns="45720" numCol="1" spcCol="0" rtlCol="0" fromWordArt="0" anchor="t" anchorCtr="0" forceAA="0" compatLnSpc="1">
+            <a:prstTxWarp prst="textNoShape">
+              <a:avLst/>
+            </a:prstTxWarp>
+            <a:spAutoFit/>
+          </a:bodyPr>
+          <a:lstStyle/>
+          <a:p>
+            <a:pPr marL="514350" indent="-514350" algn="l">
+              <a:buAutoNum type="alphaUcParenR"/>
+            </a:pPr>
+            <a:r>
+              <a:rPr lang="en-US" sz="2800" dirty="0">
+                <a:ln/>
+                <a:solidFill>
+                  <a:srgbClr val="3B3B3B"/>
+                </a:solidFill>
+                <a:latin typeface="Times New Roman" panose="02020603050405020304" pitchFamily="18" charset="0"/>
+                <a:cs typeface="Times New Roman" panose="02020603050405020304" pitchFamily="18" charset="0"/>
+                <a:sym typeface="Arial"/>
+                <a:rtl val="0"/>
+              </a:rPr>
+              <a:t>Aposymbiotic corals</a:t>
+            </a:r>
+          </a:p>
+        </p:txBody>
+      </p:sp>
+      <p:sp>
+        <p:nvSpPr>
+          <p:cNvPr id="29" name="TextBox 28">
+            <a:extLst>
+              <a:ext uri="{FF2B5EF4-FFF2-40B4-BE49-F238E27FC236}">
+                <a16:creationId xmlns:a16="http://schemas.microsoft.com/office/drawing/2014/main" id="{C6295C76-6CE9-9580-75E4-F5AF2C15B9ED}"/>
+              </a:ext>
+            </a:extLst>
+          </p:cNvPr>
+          <p:cNvSpPr txBox="1"/>
+          <p:nvPr/>
+        </p:nvSpPr>
+        <p:spPr>
+          <a:xfrm>
+            <a:off x="2483058" y="9755747"/>
+            <a:ext cx="3548032" cy="523220"/>
+          </a:xfrm>
+          <a:prstGeom prst="rect">
+            <a:avLst/>
+          </a:prstGeom>
+          <a:noFill/>
+        </p:spPr>
+        <p:txBody>
+          <a:bodyPr rot="0" spcFirstLastPara="0" vertOverflow="overflow" horzOverflow="overflow" vert="horz" wrap="square" lIns="91440" tIns="45720" rIns="91440" bIns="45720" numCol="1" spcCol="0" rtlCol="0" fromWordArt="0" anchor="t" anchorCtr="0" forceAA="0" compatLnSpc="1">
+            <a:prstTxWarp prst="textNoShape">
+              <a:avLst/>
+            </a:prstTxWarp>
+            <a:spAutoFit/>
+          </a:bodyPr>
+          <a:lstStyle/>
+          <a:p>
+            <a:pPr algn="l"/>
+            <a:r>
+              <a:rPr lang="en-US" sz="2800" dirty="0">
+                <a:ln/>
+                <a:solidFill>
+                  <a:srgbClr val="3B3B3B"/>
+                </a:solidFill>
+                <a:latin typeface="Times New Roman" panose="02020603050405020304" pitchFamily="18" charset="0"/>
+                <a:cs typeface="Times New Roman" panose="02020603050405020304" pitchFamily="18" charset="0"/>
+                <a:sym typeface="Arial"/>
+                <a:rtl val="0"/>
+              </a:rPr>
+              <a:t>B) Symbiotic corals</a:t>
+            </a:r>
+          </a:p>
+        </p:txBody>
+      </p:sp>
       <p:sp>
         <p:nvSpPr>
           <p:cNvPr id="5" name="TextBox 4">
@@ -5560,7 +5957,7 @@
         </p:nvSpPr>
         <p:spPr>
           <a:xfrm rot="16200000">
-            <a:off x="7554466" y="15397738"/>
+            <a:off x="7554464" y="15396647"/>
             <a:ext cx="457200" cy="2222076"/>
           </a:xfrm>
           <a:prstGeom prst="leftBracket">
@@ -5644,39 +6041,10 @@
           </a:p>
         </p:txBody>
       </p:sp>
-      <p:pic>
-        <p:nvPicPr>
-          <p:cNvPr id="16" name="Picture 15" descr="A graph of a number of different types of oxygen&#10;&#10;Description automatically generated with medium confidence">
-            <a:extLst>
-              <a:ext uri="{FF2B5EF4-FFF2-40B4-BE49-F238E27FC236}">
-                <a16:creationId xmlns:a16="http://schemas.microsoft.com/office/drawing/2014/main" id="{86DB7222-384B-5616-D058-AFA573CF04FE}"/>
-              </a:ext>
-            </a:extLst>
-          </p:cNvPr>
-          <p:cNvPicPr>
-            <a:picLocks noChangeAspect="1"/>
-          </p:cNvPicPr>
-          <p:nvPr/>
-        </p:nvPicPr>
-        <p:blipFill>
-          <a:blip r:embed="rId4"/>
-          <a:srcRect l="79908" t="35108" r="16919" b="62936"/>
-          <a:stretch/>
-        </p:blipFill>
-        <p:spPr>
-          <a:xfrm rot="10800000">
-            <a:off x="9889813" y="14531709"/>
-            <a:ext cx="450768" cy="352076"/>
-          </a:xfrm>
-          <a:prstGeom prst="rect">
-            <a:avLst/>
-          </a:prstGeom>
-        </p:spPr>
-      </p:pic>
     </p:spTree>
     <p:extLst>
       <p:ext uri="{BB962C8B-B14F-4D97-AF65-F5344CB8AC3E}">
-        <p14:creationId xmlns:p14="http://schemas.microsoft.com/office/powerpoint/2010/main" val="3584329673"/>
+        <p14:creationId xmlns:p14="http://schemas.microsoft.com/office/powerpoint/2010/main" val="598337248"/>
       </p:ext>
     </p:extLst>
   </p:cSld>
@@ -5705,6 +6073,483 @@
       </p:grpSpPr>
       <p:sp>
         <p:nvSpPr>
+          <p:cNvPr id="14" name="TextBox 13">
+            <a:extLst>
+              <a:ext uri="{FF2B5EF4-FFF2-40B4-BE49-F238E27FC236}">
+                <a16:creationId xmlns:a16="http://schemas.microsoft.com/office/drawing/2014/main" id="{40FAE2D1-A10E-81A2-2F57-D4B7A7FF1AC7}"/>
+              </a:ext>
+            </a:extLst>
+          </p:cNvPr>
+          <p:cNvSpPr txBox="1"/>
+          <p:nvPr/>
+        </p:nvSpPr>
+        <p:spPr>
+          <a:xfrm>
+            <a:off x="2901404" y="16783093"/>
+            <a:ext cx="3963442" cy="584775"/>
+          </a:xfrm>
+          <a:prstGeom prst="rect">
+            <a:avLst/>
+          </a:prstGeom>
+          <a:solidFill>
+            <a:schemeClr val="bg1"/>
+          </a:solidFill>
+          <a:ln>
+            <a:solidFill>
+              <a:schemeClr val="bg1"/>
+            </a:solidFill>
+          </a:ln>
+        </p:spPr>
+        <p:txBody>
+          <a:bodyPr wrap="square" rtlCol="0">
+            <a:spAutoFit/>
+          </a:bodyPr>
+          <a:lstStyle/>
+          <a:p>
+            <a:r>
+              <a:rPr lang="en-US" sz="3200" dirty="0">
+                <a:solidFill>
+                  <a:srgbClr val="4D4D4D"/>
+                </a:solidFill>
+                <a:latin typeface="Times New Roman" panose="02020603050405020304" pitchFamily="18" charset="0"/>
+                <a:cs typeface="Times New Roman" panose="02020603050405020304" pitchFamily="18" charset="0"/>
+              </a:rPr>
+              <a:t>Background NO</a:t>
+            </a:r>
+            <a:r>
+              <a:rPr lang="en-US" sz="3200" baseline="-25000" dirty="0">
+                <a:solidFill>
+                  <a:srgbClr val="4D4D4D"/>
+                </a:solidFill>
+                <a:latin typeface="Times New Roman" panose="02020603050405020304" pitchFamily="18" charset="0"/>
+                <a:cs typeface="Times New Roman" panose="02020603050405020304" pitchFamily="18" charset="0"/>
+              </a:rPr>
+              <a:t>3</a:t>
+            </a:r>
+            <a:endParaRPr lang="en-US" sz="3200" dirty="0">
+              <a:solidFill>
+                <a:srgbClr val="4D4D4D"/>
+              </a:solidFill>
+              <a:latin typeface="Times New Roman" panose="02020603050405020304" pitchFamily="18" charset="0"/>
+              <a:cs typeface="Times New Roman" panose="02020603050405020304" pitchFamily="18" charset="0"/>
+            </a:endParaRPr>
+          </a:p>
+        </p:txBody>
+      </p:sp>
+      <p:pic>
+        <p:nvPicPr>
+          <p:cNvPr id="4" name="Picture 3" descr="A diagram of different types of symbiotic state&#10;&#10;Description automatically generated">
+            <a:extLst>
+              <a:ext uri="{FF2B5EF4-FFF2-40B4-BE49-F238E27FC236}">
+                <a16:creationId xmlns:a16="http://schemas.microsoft.com/office/drawing/2014/main" id="{00A3B1C3-C277-9D37-5352-2DB6B5ED247C}"/>
+              </a:ext>
+            </a:extLst>
+          </p:cNvPr>
+          <p:cNvPicPr>
+            <a:picLocks noChangeAspect="1"/>
+          </p:cNvPicPr>
+          <p:nvPr/>
+        </p:nvPicPr>
+        <p:blipFill>
+          <a:blip r:embed="rId3"/>
+          <a:srcRect l="7997" t="47554" r="30230"/>
+          <a:stretch/>
+        </p:blipFill>
+        <p:spPr>
+          <a:xfrm>
+            <a:off x="1501450" y="9755747"/>
+            <a:ext cx="8352137" cy="6530530"/>
+          </a:xfrm>
+          <a:prstGeom prst="rect">
+            <a:avLst/>
+          </a:prstGeom>
+        </p:spPr>
+      </p:pic>
+      <p:sp>
+        <p:nvSpPr>
+          <p:cNvPr id="12" name="Rectangle 11">
+            <a:extLst>
+              <a:ext uri="{FF2B5EF4-FFF2-40B4-BE49-F238E27FC236}">
+                <a16:creationId xmlns:a16="http://schemas.microsoft.com/office/drawing/2014/main" id="{A0B6A5A2-CB7B-52CB-C6C6-2D37F9DB30FE}"/>
+              </a:ext>
+            </a:extLst>
+          </p:cNvPr>
+          <p:cNvSpPr/>
+          <p:nvPr/>
+        </p:nvSpPr>
+        <p:spPr>
+          <a:xfrm>
+            <a:off x="727587" y="5102942"/>
+            <a:ext cx="344129" cy="1278193"/>
+          </a:xfrm>
+          <a:prstGeom prst="rect">
+            <a:avLst/>
+          </a:prstGeom>
+          <a:solidFill>
+            <a:schemeClr val="bg1"/>
+          </a:solidFill>
+          <a:ln>
+            <a:solidFill>
+              <a:schemeClr val="bg1"/>
+            </a:solidFill>
+          </a:ln>
+        </p:spPr>
+        <p:style>
+          <a:lnRef idx="2">
+            <a:schemeClr val="accent1">
+              <a:shade val="15000"/>
+            </a:schemeClr>
+          </a:lnRef>
+          <a:fillRef idx="1">
+            <a:schemeClr val="accent1"/>
+          </a:fillRef>
+          <a:effectRef idx="0">
+            <a:schemeClr val="accent1"/>
+          </a:effectRef>
+          <a:fontRef idx="minor">
+            <a:schemeClr val="lt1"/>
+          </a:fontRef>
+        </p:style>
+        <p:txBody>
+          <a:bodyPr rtlCol="0" anchor="ctr"/>
+          <a:lstStyle/>
+          <a:p>
+            <a:pPr algn="ctr"/>
+            <a:endParaRPr lang="en-US"/>
+          </a:p>
+        </p:txBody>
+      </p:sp>
+      <p:sp>
+        <p:nvSpPr>
+          <p:cNvPr id="10" name="TextBox 9">
+            <a:extLst>
+              <a:ext uri="{FF2B5EF4-FFF2-40B4-BE49-F238E27FC236}">
+                <a16:creationId xmlns:a16="http://schemas.microsoft.com/office/drawing/2014/main" id="{B1497C62-6DD4-691B-D883-7C6AB4CE0CC1}"/>
+              </a:ext>
+            </a:extLst>
+          </p:cNvPr>
+          <p:cNvSpPr txBox="1"/>
+          <p:nvPr/>
+        </p:nvSpPr>
+        <p:spPr>
+          <a:xfrm rot="16200000">
+            <a:off x="-2607978" y="12991819"/>
+            <a:ext cx="8218858" cy="523220"/>
+          </a:xfrm>
+          <a:prstGeom prst="rect">
+            <a:avLst/>
+          </a:prstGeom>
+          <a:solidFill>
+            <a:schemeClr val="bg1"/>
+          </a:solidFill>
+          <a:ln>
+            <a:solidFill>
+              <a:schemeClr val="bg1"/>
+            </a:solidFill>
+          </a:ln>
+        </p:spPr>
+        <p:txBody>
+          <a:bodyPr wrap="square" rtlCol="0">
+            <a:spAutoFit/>
+          </a:bodyPr>
+          <a:lstStyle/>
+          <a:p>
+            <a:pPr algn="ctr"/>
+            <a:r>
+              <a:rPr lang="en-US" sz="2800" dirty="0">
+                <a:solidFill>
+                  <a:srgbClr val="4D4D4D"/>
+                </a:solidFill>
+                <a:latin typeface="Times New Roman" panose="02020603050405020304" pitchFamily="18" charset="0"/>
+                <a:cs typeface="Times New Roman" panose="02020603050405020304" pitchFamily="18" charset="0"/>
+              </a:rPr>
+              <a:t>Photosynthetic efficiency (Fv/Fm)</a:t>
+            </a:r>
+          </a:p>
+        </p:txBody>
+      </p:sp>
+      <p:pic>
+        <p:nvPicPr>
+          <p:cNvPr id="2" name="Picture 1" descr="A graph of a number of different types of oxygen&#10;&#10;Description automatically generated with medium confidence">
+            <a:extLst>
+              <a:ext uri="{FF2B5EF4-FFF2-40B4-BE49-F238E27FC236}">
+                <a16:creationId xmlns:a16="http://schemas.microsoft.com/office/drawing/2014/main" id="{7849AF67-6A09-CCAE-6915-4D5D63902ADC}"/>
+              </a:ext>
+            </a:extLst>
+          </p:cNvPr>
+          <p:cNvPicPr>
+            <a:picLocks noChangeAspect="1"/>
+          </p:cNvPicPr>
+          <p:nvPr/>
+        </p:nvPicPr>
+        <p:blipFill>
+          <a:blip r:embed="rId4"/>
+          <a:srcRect l="79007" t="38202" r="1545" b="53405"/>
+          <a:stretch/>
+        </p:blipFill>
+        <p:spPr>
+          <a:xfrm>
+            <a:off x="9853587" y="12102472"/>
+            <a:ext cx="2761487" cy="1292352"/>
+          </a:xfrm>
+          <a:prstGeom prst="rect">
+            <a:avLst/>
+          </a:prstGeom>
+        </p:spPr>
+      </p:pic>
+      <p:pic>
+        <p:nvPicPr>
+          <p:cNvPr id="9" name="Picture 8" descr="A graph of a number of different types of oxygen&#10;&#10;Description automatically generated with medium confidence">
+            <a:extLst>
+              <a:ext uri="{FF2B5EF4-FFF2-40B4-BE49-F238E27FC236}">
+                <a16:creationId xmlns:a16="http://schemas.microsoft.com/office/drawing/2014/main" id="{A60BC6E7-D092-3257-C377-8695B9F334B4}"/>
+              </a:ext>
+            </a:extLst>
+          </p:cNvPr>
+          <p:cNvPicPr>
+            <a:picLocks noChangeAspect="1"/>
+          </p:cNvPicPr>
+          <p:nvPr/>
+        </p:nvPicPr>
+        <p:blipFill>
+          <a:blip r:embed="rId4"/>
+          <a:srcRect l="77753" t="47585" b="42914"/>
+          <a:stretch/>
+        </p:blipFill>
+        <p:spPr>
+          <a:xfrm>
+            <a:off x="9654870" y="13671807"/>
+            <a:ext cx="3158922" cy="1463040"/>
+          </a:xfrm>
+          <a:prstGeom prst="rect">
+            <a:avLst/>
+          </a:prstGeom>
+        </p:spPr>
+      </p:pic>
+      <p:sp>
+        <p:nvSpPr>
+          <p:cNvPr id="5" name="TextBox 4">
+            <a:extLst>
+              <a:ext uri="{FF2B5EF4-FFF2-40B4-BE49-F238E27FC236}">
+                <a16:creationId xmlns:a16="http://schemas.microsoft.com/office/drawing/2014/main" id="{E3F4C998-153B-9FC6-2A2A-E6DE57C5B93A}"/>
+              </a:ext>
+            </a:extLst>
+          </p:cNvPr>
+          <p:cNvSpPr txBox="1"/>
+          <p:nvPr/>
+        </p:nvSpPr>
+        <p:spPr>
+          <a:xfrm>
+            <a:off x="6672026" y="16784185"/>
+            <a:ext cx="2594992" cy="584775"/>
+          </a:xfrm>
+          <a:prstGeom prst="rect">
+            <a:avLst/>
+          </a:prstGeom>
+          <a:solidFill>
+            <a:schemeClr val="bg1"/>
+          </a:solidFill>
+          <a:ln>
+            <a:solidFill>
+              <a:schemeClr val="bg1"/>
+            </a:solidFill>
+          </a:ln>
+        </p:spPr>
+        <p:txBody>
+          <a:bodyPr wrap="square" rtlCol="0">
+            <a:spAutoFit/>
+          </a:bodyPr>
+          <a:lstStyle/>
+          <a:p>
+            <a:r>
+              <a:rPr lang="en-US" sz="3200" dirty="0">
+                <a:solidFill>
+                  <a:srgbClr val="4D4D4D"/>
+                </a:solidFill>
+                <a:latin typeface="Times New Roman" panose="02020603050405020304" pitchFamily="18" charset="0"/>
+                <a:cs typeface="Times New Roman" panose="02020603050405020304" pitchFamily="18" charset="0"/>
+              </a:rPr>
+              <a:t>Elevated NO</a:t>
+            </a:r>
+            <a:r>
+              <a:rPr lang="en-US" sz="3200" baseline="-25000" dirty="0">
+                <a:solidFill>
+                  <a:srgbClr val="4D4D4D"/>
+                </a:solidFill>
+                <a:latin typeface="Times New Roman" panose="02020603050405020304" pitchFamily="18" charset="0"/>
+                <a:cs typeface="Times New Roman" panose="02020603050405020304" pitchFamily="18" charset="0"/>
+              </a:rPr>
+              <a:t>3</a:t>
+            </a:r>
+            <a:endParaRPr lang="en-US" sz="3200" dirty="0">
+              <a:solidFill>
+                <a:srgbClr val="4D4D4D"/>
+              </a:solidFill>
+              <a:latin typeface="Times New Roman" panose="02020603050405020304" pitchFamily="18" charset="0"/>
+              <a:cs typeface="Times New Roman" panose="02020603050405020304" pitchFamily="18" charset="0"/>
+            </a:endParaRPr>
+          </a:p>
+        </p:txBody>
+      </p:sp>
+      <p:sp>
+        <p:nvSpPr>
+          <p:cNvPr id="6" name="Left Bracket 5">
+            <a:extLst>
+              <a:ext uri="{FF2B5EF4-FFF2-40B4-BE49-F238E27FC236}">
+                <a16:creationId xmlns:a16="http://schemas.microsoft.com/office/drawing/2014/main" id="{9C51E2D2-3DA2-D747-F759-6226623287B5}"/>
+              </a:ext>
+            </a:extLst>
+          </p:cNvPr>
+          <p:cNvSpPr/>
+          <p:nvPr/>
+        </p:nvSpPr>
+        <p:spPr>
+          <a:xfrm rot="16200000">
+            <a:off x="7554466" y="15397738"/>
+            <a:ext cx="457200" cy="2222076"/>
+          </a:xfrm>
+          <a:prstGeom prst="leftBracket">
+            <a:avLst/>
+          </a:prstGeom>
+          <a:ln w="38100">
+            <a:solidFill>
+              <a:srgbClr val="4D4D4D"/>
+            </a:solidFill>
+          </a:ln>
+        </p:spPr>
+        <p:style>
+          <a:lnRef idx="2">
+            <a:schemeClr val="dk1"/>
+          </a:lnRef>
+          <a:fillRef idx="0">
+            <a:schemeClr val="dk1"/>
+          </a:fillRef>
+          <a:effectRef idx="1">
+            <a:schemeClr val="dk1"/>
+          </a:effectRef>
+          <a:fontRef idx="minor">
+            <a:schemeClr val="tx1"/>
+          </a:fontRef>
+        </p:style>
+        <p:txBody>
+          <a:bodyPr rtlCol="0" anchor="ctr"/>
+          <a:lstStyle/>
+          <a:p>
+            <a:pPr algn="ctr"/>
+            <a:endParaRPr lang="en-US"/>
+          </a:p>
+        </p:txBody>
+      </p:sp>
+      <p:sp>
+        <p:nvSpPr>
+          <p:cNvPr id="15" name="Left Bracket 14">
+            <a:extLst>
+              <a:ext uri="{FF2B5EF4-FFF2-40B4-BE49-F238E27FC236}">
+                <a16:creationId xmlns:a16="http://schemas.microsoft.com/office/drawing/2014/main" id="{3318E1A0-A4D7-89A5-57D1-E40AC16241C3}"/>
+              </a:ext>
+            </a:extLst>
+          </p:cNvPr>
+          <p:cNvSpPr/>
+          <p:nvPr/>
+        </p:nvSpPr>
+        <p:spPr>
+          <a:xfrm rot="16200000">
+            <a:off x="4137544" y="15397737"/>
+            <a:ext cx="457200" cy="2222078"/>
+          </a:xfrm>
+          <a:prstGeom prst="leftBracket">
+            <a:avLst/>
+          </a:prstGeom>
+          <a:ln w="38100">
+            <a:solidFill>
+              <a:srgbClr val="4D4D4D"/>
+            </a:solidFill>
+          </a:ln>
+        </p:spPr>
+        <p:style>
+          <a:lnRef idx="2">
+            <a:schemeClr val="dk1"/>
+          </a:lnRef>
+          <a:fillRef idx="0">
+            <a:schemeClr val="dk1"/>
+          </a:fillRef>
+          <a:effectRef idx="1">
+            <a:schemeClr val="dk1"/>
+          </a:effectRef>
+          <a:fontRef idx="minor">
+            <a:schemeClr val="tx1"/>
+          </a:fontRef>
+        </p:style>
+        <p:txBody>
+          <a:bodyPr rtlCol="0" anchor="ctr"/>
+          <a:lstStyle/>
+          <a:p>
+            <a:pPr algn="ctr"/>
+            <a:endParaRPr lang="en-US"/>
+          </a:p>
+        </p:txBody>
+      </p:sp>
+      <p:pic>
+        <p:nvPicPr>
+          <p:cNvPr id="16" name="Picture 15" descr="A graph of a number of different types of oxygen&#10;&#10;Description automatically generated with medium confidence">
+            <a:extLst>
+              <a:ext uri="{FF2B5EF4-FFF2-40B4-BE49-F238E27FC236}">
+                <a16:creationId xmlns:a16="http://schemas.microsoft.com/office/drawing/2014/main" id="{86DB7222-384B-5616-D058-AFA573CF04FE}"/>
+              </a:ext>
+            </a:extLst>
+          </p:cNvPr>
+          <p:cNvPicPr>
+            <a:picLocks noChangeAspect="1"/>
+          </p:cNvPicPr>
+          <p:nvPr/>
+        </p:nvPicPr>
+        <p:blipFill>
+          <a:blip r:embed="rId4"/>
+          <a:srcRect l="79908" t="35108" r="16919" b="62936"/>
+          <a:stretch/>
+        </p:blipFill>
+        <p:spPr>
+          <a:xfrm rot="10800000">
+            <a:off x="9889813" y="14531709"/>
+            <a:ext cx="450768" cy="352076"/>
+          </a:xfrm>
+          <a:prstGeom prst="rect">
+            <a:avLst/>
+          </a:prstGeom>
+        </p:spPr>
+      </p:pic>
+    </p:spTree>
+    <p:extLst>
+      <p:ext uri="{BB962C8B-B14F-4D97-AF65-F5344CB8AC3E}">
+        <p14:creationId xmlns:p14="http://schemas.microsoft.com/office/powerpoint/2010/main" val="3584329673"/>
+      </p:ext>
+    </p:extLst>
+  </p:cSld>
+  <p:clrMapOvr>
+    <a:masterClrMapping/>
+  </p:clrMapOvr>
+</p:sld>
+</file>
+
+<file path=ppt/slides/slide6.xml><?xml version="1.0" encoding="utf-8"?>
+<p:sld xmlns:a="http://schemas.openxmlformats.org/drawingml/2006/main" xmlns:r="http://schemas.openxmlformats.org/officeDocument/2006/relationships" xmlns:p="http://schemas.openxmlformats.org/presentationml/2006/main">
+  <p:cSld>
+    <p:spTree>
+      <p:nvGrpSpPr>
+        <p:cNvPr id="1" name=""/>
+        <p:cNvGrpSpPr/>
+        <p:nvPr/>
+      </p:nvGrpSpPr>
+      <p:grpSpPr>
+        <a:xfrm>
+          <a:off x="0" y="0"/>
+          <a:ext cx="0" cy="0"/>
+          <a:chOff x="0" y="0"/>
+          <a:chExt cx="0" cy="0"/>
+        </a:xfrm>
+      </p:grpSpPr>
+      <p:sp>
+        <p:nvSpPr>
           <p:cNvPr id="4" name="TextBox 3">
             <a:extLst>
               <a:ext uri="{FF2B5EF4-FFF2-40B4-BE49-F238E27FC236}">
@@ -7050,10 +7895,10 @@
         </p:nvGrpSpPr>
         <p:grpSpPr>
           <a:xfrm>
-            <a:off x="14091430" y="6231708"/>
-            <a:ext cx="2865078" cy="1892007"/>
-            <a:chOff x="14139555" y="6028955"/>
-            <a:chExt cx="2865078" cy="1892007"/>
+            <a:off x="14099260" y="6474045"/>
+            <a:ext cx="2865078" cy="1585540"/>
+            <a:chOff x="14147385" y="6271292"/>
+            <a:chExt cx="2865078" cy="1585540"/>
           </a:xfrm>
         </p:grpSpPr>
         <p:sp>
@@ -7070,8 +7915,8 @@
           </p:nvSpPr>
           <p:spPr>
             <a:xfrm>
-              <a:off x="14139555" y="6028955"/>
-              <a:ext cx="2865078" cy="1892007"/>
+              <a:off x="14147385" y="6271292"/>
+              <a:ext cx="2865078" cy="1585540"/>
             </a:xfrm>
             <a:prstGeom prst="roundRect">
               <a:avLst/>
@@ -7097,16 +7942,12 @@
             </a:fontRef>
           </p:style>
           <p:txBody>
-            <a:bodyPr wrap="square" rtlCol="0">
+            <a:bodyPr wrap="square" tIns="0" bIns="0" rtlCol="0">
               <a:spAutoFit/>
             </a:bodyPr>
             <a:lstStyle/>
             <a:p>
-              <a:pPr algn="ctr">
-                <a:lnSpc>
-                  <a:spcPct val="150000"/>
-                </a:lnSpc>
-              </a:pPr>
+              <a:pPr algn="ctr"/>
               <a:r>
                 <a:rPr lang="en-US" sz="2400" u="sng" dirty="0">
                   <a:solidFill>
@@ -7308,6 +8149,364 @@
     <p:extLst>
       <p:ext uri="{BB962C8B-B14F-4D97-AF65-F5344CB8AC3E}">
         <p14:creationId xmlns:p14="http://schemas.microsoft.com/office/powerpoint/2010/main" val="1364829409"/>
+      </p:ext>
+    </p:extLst>
+  </p:cSld>
+  <p:clrMapOvr>
+    <a:masterClrMapping/>
+  </p:clrMapOvr>
+</p:sld>
+</file>
+
+<file path=ppt/slides/slide7.xml><?xml version="1.0" encoding="utf-8"?>
+<p:sld xmlns:a="http://schemas.openxmlformats.org/drawingml/2006/main" xmlns:r="http://schemas.openxmlformats.org/officeDocument/2006/relationships" xmlns:p="http://schemas.openxmlformats.org/presentationml/2006/main">
+  <p:cSld>
+    <p:spTree>
+      <p:nvGrpSpPr>
+        <p:cNvPr id="1" name=""/>
+        <p:cNvGrpSpPr/>
+        <p:nvPr/>
+      </p:nvGrpSpPr>
+      <p:grpSpPr>
+        <a:xfrm>
+          <a:off x="0" y="0"/>
+          <a:ext cx="0" cy="0"/>
+          <a:chOff x="0" y="0"/>
+          <a:chExt cx="0" cy="0"/>
+        </a:xfrm>
+      </p:grpSpPr>
+      <p:pic>
+        <p:nvPicPr>
+          <p:cNvPr id="5" name="Content Placeholder 4">
+            <a:extLst>
+              <a:ext uri="{FF2B5EF4-FFF2-40B4-BE49-F238E27FC236}">
+                <a16:creationId xmlns:a16="http://schemas.microsoft.com/office/drawing/2014/main" id="{5CDBB9BE-BB26-8BDE-CFE8-C2C0BD919E0B}"/>
+              </a:ext>
+            </a:extLst>
+          </p:cNvPr>
+          <p:cNvPicPr>
+            <a:picLocks noChangeAspect="1"/>
+          </p:cNvPicPr>
+          <p:nvPr>
+            <p:ph idx="1"/>
+          </p:nvPr>
+        </p:nvPicPr>
+        <p:blipFill>
+          <a:blip r:embed="rId2"/>
+          <a:srcRect t="2585" b="1427"/>
+          <a:stretch/>
+        </p:blipFill>
+        <p:spPr>
+          <a:xfrm>
+            <a:off x="4038956" y="204516"/>
+            <a:ext cx="9905644" cy="17827846"/>
+          </a:xfrm>
+        </p:spPr>
+      </p:pic>
+      <p:sp>
+        <p:nvSpPr>
+          <p:cNvPr id="7" name="TextBox 6">
+            <a:extLst>
+              <a:ext uri="{FF2B5EF4-FFF2-40B4-BE49-F238E27FC236}">
+                <a16:creationId xmlns:a16="http://schemas.microsoft.com/office/drawing/2014/main" id="{61E3E583-2C5F-154C-D5F3-BE89E05C76B8}"/>
+              </a:ext>
+            </a:extLst>
+          </p:cNvPr>
+          <p:cNvSpPr txBox="1"/>
+          <p:nvPr/>
+        </p:nvSpPr>
+        <p:spPr>
+          <a:xfrm rot="16200000">
+            <a:off x="3018678" y="8882389"/>
+            <a:ext cx="2126225" cy="523220"/>
+          </a:xfrm>
+          <a:prstGeom prst="rect">
+            <a:avLst/>
+          </a:prstGeom>
+          <a:solidFill>
+            <a:schemeClr val="bg1"/>
+          </a:solidFill>
+        </p:spPr>
+        <p:txBody>
+          <a:bodyPr wrap="square" rtlCol="0">
+            <a:spAutoFit/>
+          </a:bodyPr>
+          <a:lstStyle/>
+          <a:p>
+            <a:pPr algn="ctr"/>
+            <a:r>
+              <a:rPr lang="en-US" sz="2800" dirty="0"/>
+              <a:t>Covariates</a:t>
+            </a:r>
+          </a:p>
+        </p:txBody>
+      </p:sp>
+    </p:spTree>
+    <p:extLst>
+      <p:ext uri="{BB962C8B-B14F-4D97-AF65-F5344CB8AC3E}">
+        <p14:creationId xmlns:p14="http://schemas.microsoft.com/office/powerpoint/2010/main" val="1481645759"/>
+      </p:ext>
+    </p:extLst>
+  </p:cSld>
+  <p:clrMapOvr>
+    <a:masterClrMapping/>
+  </p:clrMapOvr>
+</p:sld>
+</file>
+
+<file path=ppt/slides/slide8.xml><?xml version="1.0" encoding="utf-8"?>
+<p:sld xmlns:a="http://schemas.openxmlformats.org/drawingml/2006/main" xmlns:r="http://schemas.openxmlformats.org/officeDocument/2006/relationships" xmlns:p="http://schemas.openxmlformats.org/presentationml/2006/main">
+  <p:cSld>
+    <p:spTree>
+      <p:nvGrpSpPr>
+        <p:cNvPr id="1" name=""/>
+        <p:cNvGrpSpPr/>
+        <p:nvPr/>
+      </p:nvGrpSpPr>
+      <p:grpSpPr>
+        <a:xfrm>
+          <a:off x="0" y="0"/>
+          <a:ext cx="0" cy="0"/>
+          <a:chOff x="0" y="0"/>
+          <a:chExt cx="0" cy="0"/>
+        </a:xfrm>
+      </p:grpSpPr>
+      <p:pic>
+        <p:nvPicPr>
+          <p:cNvPr id="5" name="Content Placeholder 4">
+            <a:extLst>
+              <a:ext uri="{FF2B5EF4-FFF2-40B4-BE49-F238E27FC236}">
+                <a16:creationId xmlns:a16="http://schemas.microsoft.com/office/drawing/2014/main" id="{6D9836EE-346B-587E-A099-E096E9998AD9}"/>
+              </a:ext>
+            </a:extLst>
+          </p:cNvPr>
+          <p:cNvPicPr>
+            <a:picLocks noGrp="1" noChangeAspect="1"/>
+          </p:cNvPicPr>
+          <p:nvPr>
+            <p:ph idx="1"/>
+          </p:nvPr>
+        </p:nvPicPr>
+        <p:blipFill>
+          <a:blip r:embed="rId2"/>
+          <a:srcRect t="2879" b="1194"/>
+          <a:stretch/>
+        </p:blipFill>
+        <p:spPr>
+          <a:xfrm>
+            <a:off x="3266968" y="179345"/>
+            <a:ext cx="10068031" cy="18108655"/>
+          </a:xfrm>
+        </p:spPr>
+      </p:pic>
+      <p:sp>
+        <p:nvSpPr>
+          <p:cNvPr id="6" name="TextBox 5">
+            <a:extLst>
+              <a:ext uri="{FF2B5EF4-FFF2-40B4-BE49-F238E27FC236}">
+                <a16:creationId xmlns:a16="http://schemas.microsoft.com/office/drawing/2014/main" id="{AD3942F7-DFFD-B292-5CD1-7E85C4E87777}"/>
+              </a:ext>
+            </a:extLst>
+          </p:cNvPr>
+          <p:cNvSpPr txBox="1"/>
+          <p:nvPr/>
+        </p:nvSpPr>
+        <p:spPr>
+          <a:xfrm rot="16200000">
+            <a:off x="2496243" y="8972061"/>
+            <a:ext cx="2126225" cy="523220"/>
+          </a:xfrm>
+          <a:prstGeom prst="rect">
+            <a:avLst/>
+          </a:prstGeom>
+          <a:solidFill>
+            <a:schemeClr val="bg1"/>
+          </a:solidFill>
+        </p:spPr>
+        <p:txBody>
+          <a:bodyPr wrap="square" rtlCol="0">
+            <a:spAutoFit/>
+          </a:bodyPr>
+          <a:lstStyle/>
+          <a:p>
+            <a:pPr algn="ctr"/>
+            <a:r>
+              <a:rPr lang="en-US" sz="2800" dirty="0"/>
+              <a:t>Covariates</a:t>
+            </a:r>
+          </a:p>
+        </p:txBody>
+      </p:sp>
+      <p:sp>
+        <p:nvSpPr>
+          <p:cNvPr id="7" name="TextBox 6">
+            <a:extLst>
+              <a:ext uri="{FF2B5EF4-FFF2-40B4-BE49-F238E27FC236}">
+                <a16:creationId xmlns:a16="http://schemas.microsoft.com/office/drawing/2014/main" id="{0A3884AF-8246-08A9-4907-B45DEE3949FB}"/>
+              </a:ext>
+            </a:extLst>
+          </p:cNvPr>
+          <p:cNvSpPr txBox="1"/>
+          <p:nvPr/>
+        </p:nvSpPr>
+        <p:spPr>
+          <a:xfrm>
+            <a:off x="14503400" y="7162800"/>
+            <a:ext cx="3276600" cy="369332"/>
+          </a:xfrm>
+          <a:prstGeom prst="rect">
+            <a:avLst/>
+          </a:prstGeom>
+          <a:noFill/>
+        </p:spPr>
+        <p:txBody>
+          <a:bodyPr wrap="square" rtlCol="0">
+            <a:spAutoFit/>
+          </a:bodyPr>
+          <a:lstStyle/>
+          <a:p>
+            <a:r>
+              <a:rPr lang="en-US" dirty="0"/>
+              <a:t>PAM delta</a:t>
+            </a:r>
+          </a:p>
+        </p:txBody>
+      </p:sp>
+    </p:spTree>
+    <p:extLst>
+      <p:ext uri="{BB962C8B-B14F-4D97-AF65-F5344CB8AC3E}">
+        <p14:creationId xmlns:p14="http://schemas.microsoft.com/office/powerpoint/2010/main" val="2142290802"/>
+      </p:ext>
+    </p:extLst>
+  </p:cSld>
+  <p:clrMapOvr>
+    <a:masterClrMapping/>
+  </p:clrMapOvr>
+</p:sld>
+</file>
+
+<file path=ppt/slides/slide9.xml><?xml version="1.0" encoding="utf-8"?>
+<p:sld xmlns:a="http://schemas.openxmlformats.org/drawingml/2006/main" xmlns:r="http://schemas.openxmlformats.org/officeDocument/2006/relationships" xmlns:p="http://schemas.openxmlformats.org/presentationml/2006/main">
+  <p:cSld>
+    <p:spTree>
+      <p:nvGrpSpPr>
+        <p:cNvPr id="1" name=""/>
+        <p:cNvGrpSpPr/>
+        <p:nvPr/>
+      </p:nvGrpSpPr>
+      <p:grpSpPr>
+        <a:xfrm>
+          <a:off x="0" y="0"/>
+          <a:ext cx="0" cy="0"/>
+          <a:chOff x="0" y="0"/>
+          <a:chExt cx="0" cy="0"/>
+        </a:xfrm>
+      </p:grpSpPr>
+      <p:pic>
+        <p:nvPicPr>
+          <p:cNvPr id="5" name="Content Placeholder 4">
+            <a:extLst>
+              <a:ext uri="{FF2B5EF4-FFF2-40B4-BE49-F238E27FC236}">
+                <a16:creationId xmlns:a16="http://schemas.microsoft.com/office/drawing/2014/main" id="{7001337A-54D1-46E9-B68A-EB135F8FB67A}"/>
+              </a:ext>
+            </a:extLst>
+          </p:cNvPr>
+          <p:cNvPicPr>
+            <a:picLocks noGrp="1" noChangeAspect="1"/>
+          </p:cNvPicPr>
+          <p:nvPr>
+            <p:ph idx="1"/>
+          </p:nvPr>
+        </p:nvPicPr>
+        <p:blipFill>
+          <a:blip r:embed="rId2"/>
+          <a:srcRect t="3133" b="1423"/>
+          <a:stretch/>
+        </p:blipFill>
+        <p:spPr>
+          <a:xfrm>
+            <a:off x="3371320" y="284403"/>
+            <a:ext cx="12376680" cy="17719193"/>
+          </a:xfrm>
+        </p:spPr>
+      </p:pic>
+      <p:sp>
+        <p:nvSpPr>
+          <p:cNvPr id="6" name="TextBox 5">
+            <a:extLst>
+              <a:ext uri="{FF2B5EF4-FFF2-40B4-BE49-F238E27FC236}">
+                <a16:creationId xmlns:a16="http://schemas.microsoft.com/office/drawing/2014/main" id="{1CC734C9-2CA4-37B3-45F9-59303E9A6F03}"/>
+              </a:ext>
+            </a:extLst>
+          </p:cNvPr>
+          <p:cNvSpPr txBox="1"/>
+          <p:nvPr/>
+        </p:nvSpPr>
+        <p:spPr>
+          <a:xfrm rot="16200000">
+            <a:off x="2496243" y="8972061"/>
+            <a:ext cx="2126225" cy="523220"/>
+          </a:xfrm>
+          <a:prstGeom prst="rect">
+            <a:avLst/>
+          </a:prstGeom>
+          <a:solidFill>
+            <a:schemeClr val="bg1"/>
+          </a:solidFill>
+        </p:spPr>
+        <p:txBody>
+          <a:bodyPr wrap="square" rtlCol="0">
+            <a:spAutoFit/>
+          </a:bodyPr>
+          <a:lstStyle/>
+          <a:p>
+            <a:pPr algn="ctr"/>
+            <a:r>
+              <a:rPr lang="en-US" sz="2800" dirty="0"/>
+              <a:t>Covariates</a:t>
+            </a:r>
+          </a:p>
+        </p:txBody>
+      </p:sp>
+      <p:sp>
+        <p:nvSpPr>
+          <p:cNvPr id="7" name="TextBox 6">
+            <a:extLst>
+              <a:ext uri="{FF2B5EF4-FFF2-40B4-BE49-F238E27FC236}">
+                <a16:creationId xmlns:a16="http://schemas.microsoft.com/office/drawing/2014/main" id="{2E79E3BD-B260-F1FF-9E05-BD386F3A7BA3}"/>
+              </a:ext>
+            </a:extLst>
+          </p:cNvPr>
+          <p:cNvSpPr txBox="1"/>
+          <p:nvPr/>
+        </p:nvSpPr>
+        <p:spPr>
+          <a:xfrm>
+            <a:off x="16649700" y="7188200"/>
+            <a:ext cx="3276600" cy="369332"/>
+          </a:xfrm>
+          <a:prstGeom prst="rect">
+            <a:avLst/>
+          </a:prstGeom>
+          <a:noFill/>
+        </p:spPr>
+        <p:txBody>
+          <a:bodyPr wrap="square" rtlCol="0">
+            <a:spAutoFit/>
+          </a:bodyPr>
+          <a:lstStyle/>
+          <a:p>
+            <a:r>
+              <a:rPr lang="en-US" dirty="0"/>
+              <a:t>RGB delta</a:t>
+            </a:r>
+          </a:p>
+        </p:txBody>
+      </p:sp>
+    </p:spTree>
+    <p:extLst>
+      <p:ext uri="{BB962C8B-B14F-4D97-AF65-F5344CB8AC3E}">
+        <p14:creationId xmlns:p14="http://schemas.microsoft.com/office/powerpoint/2010/main" val="2089551791"/>
       </p:ext>
     </p:extLst>
   </p:cSld>

</xml_diff>